<commit_message>
Added a slide on ML part and modified text model slide
</commit_message>
<xml_diff>
--- a/Presentation/Presentazione Finale-UPDATED.pptx
+++ b/Presentation/Presentazione Finale-UPDATED.pptx
@@ -5,7 +5,7 @@
     <p:sldMasterId id="2147483730" r:id="rId1"/>
   </p:sldMasterIdLst>
   <p:notesMasterIdLst>
-    <p:notesMasterId r:id="rId23"/>
+    <p:notesMasterId r:id="rId24"/>
   </p:notesMasterIdLst>
   <p:sldIdLst>
     <p:sldId id="313" r:id="rId2"/>
@@ -22,46 +22,47 @@
     <p:sldId id="282" r:id="rId13"/>
     <p:sldId id="284" r:id="rId14"/>
     <p:sldId id="285" r:id="rId15"/>
-    <p:sldId id="286" r:id="rId16"/>
-    <p:sldId id="287" r:id="rId17"/>
-    <p:sldId id="288" r:id="rId18"/>
-    <p:sldId id="289" r:id="rId19"/>
-    <p:sldId id="290" r:id="rId20"/>
-    <p:sldId id="293" r:id="rId21"/>
-    <p:sldId id="294" r:id="rId22"/>
+    <p:sldId id="322" r:id="rId16"/>
+    <p:sldId id="286" r:id="rId17"/>
+    <p:sldId id="287" r:id="rId18"/>
+    <p:sldId id="288" r:id="rId19"/>
+    <p:sldId id="289" r:id="rId20"/>
+    <p:sldId id="290" r:id="rId21"/>
+    <p:sldId id="293" r:id="rId22"/>
+    <p:sldId id="294" r:id="rId23"/>
   </p:sldIdLst>
   <p:sldSz cx="9144000" cy="5143500" type="screen16x9"/>
   <p:notesSz cx="6858000" cy="9144000"/>
   <p:embeddedFontLst>
     <p:embeddedFont>
-      <p:font typeface="Montserrat" panose="00000500000000000000" pitchFamily="2" charset="0"/>
-      <p:regular r:id="rId24"/>
-      <p:bold r:id="rId25"/>
-      <p:italic r:id="rId26"/>
-      <p:boldItalic r:id="rId27"/>
+      <p:font typeface="Montserrat" pitchFamily="2" charset="77"/>
+      <p:regular r:id="rId25"/>
+      <p:bold r:id="rId26"/>
+      <p:italic r:id="rId27"/>
+      <p:boldItalic r:id="rId28"/>
     </p:embeddedFont>
     <p:embeddedFont>
-      <p:font typeface="Montserrat Black" panose="00000A00000000000000" pitchFamily="2" charset="0"/>
-      <p:bold r:id="rId28"/>
-      <p:italic r:id="rId29"/>
-      <p:boldItalic r:id="rId30"/>
+      <p:font typeface="Montserrat Black" panose="020F0502020204030204" pitchFamily="34" charset="0"/>
+      <p:bold r:id="rId29"/>
+      <p:italic r:id="rId30"/>
+      <p:boldItalic r:id="rId31"/>
     </p:embeddedFont>
     <p:embeddedFont>
-      <p:font typeface="Quicksand" panose="020B0604020202020204" charset="0"/>
-      <p:regular r:id="rId31"/>
-      <p:bold r:id="rId32"/>
+      <p:font typeface="Quicksand" pitchFamily="2" charset="77"/>
+      <p:regular r:id="rId32"/>
+      <p:bold r:id="rId33"/>
     </p:embeddedFont>
     <p:embeddedFont>
       <p:font typeface="Roboto" panose="02000000000000000000" pitchFamily="2" charset="0"/>
-      <p:regular r:id="rId33"/>
-      <p:bold r:id="rId34"/>
-      <p:italic r:id="rId35"/>
-      <p:boldItalic r:id="rId36"/>
+      <p:regular r:id="rId34"/>
+      <p:bold r:id="rId35"/>
+      <p:italic r:id="rId36"/>
+      <p:boldItalic r:id="rId37"/>
     </p:embeddedFont>
     <p:embeddedFont>
-      <p:font typeface="Roboto Condensed Light" panose="02000000000000000000" pitchFamily="2" charset="0"/>
-      <p:regular r:id="rId37"/>
-      <p:italic r:id="rId38"/>
+      <p:font typeface="Roboto Condensed Light" panose="020F0302020204030204" pitchFamily="34" charset="0"/>
+      <p:regular r:id="rId38"/>
+      <p:italic r:id="rId39"/>
     </p:embeddedFont>
   </p:embeddedFontLst>
   <p:defaultTextStyle>
@@ -1495,7 +1496,7 @@
     </p:spTree>
     <p:extLst>
       <p:ext uri="{BB962C8B-B14F-4D97-AF65-F5344CB8AC3E}">
-        <p14:creationId xmlns:p14="http://schemas.microsoft.com/office/powerpoint/2010/main" val="1372246020"/>
+        <p14:creationId xmlns:p14="http://schemas.microsoft.com/office/powerpoint/2010/main" val="2630769382"/>
       </p:ext>
     </p:extLst>
   </p:cSld>
@@ -1604,6 +1605,115 @@
     </p:spTree>
     <p:extLst>
       <p:ext uri="{BB962C8B-B14F-4D97-AF65-F5344CB8AC3E}">
+        <p14:creationId xmlns:p14="http://schemas.microsoft.com/office/powerpoint/2010/main" val="1372246020"/>
+      </p:ext>
+    </p:extLst>
+  </p:cSld>
+  <p:clrMapOvr>
+    <a:masterClrMapping/>
+  </p:clrMapOvr>
+</p:notes>
+</file>
+
+<file path=ppt/notesSlides/notesSlide17.xml><?xml version="1.0" encoding="utf-8"?>
+<p:notes xmlns:a="http://schemas.openxmlformats.org/drawingml/2006/main" xmlns:r="http://schemas.openxmlformats.org/officeDocument/2006/relationships" xmlns:p="http://schemas.openxmlformats.org/presentationml/2006/main" showMasterSp="0" showMasterPhAnim="0">
+  <p:cSld>
+    <p:spTree>
+      <p:nvGrpSpPr>
+        <p:cNvPr id="1" name="Shape 1345"/>
+        <p:cNvGrpSpPr/>
+        <p:nvPr/>
+      </p:nvGrpSpPr>
+      <p:grpSpPr>
+        <a:xfrm>
+          <a:off x="0" y="0"/>
+          <a:ext cx="0" cy="0"/>
+          <a:chOff x="0" y="0"/>
+          <a:chExt cx="0" cy="0"/>
+        </a:xfrm>
+      </p:grpSpPr>
+      <p:sp>
+        <p:nvSpPr>
+          <p:cNvPr id="1346" name="Google Shape;1346;gd279b9a442_0_1447:notes"/>
+          <p:cNvSpPr>
+            <a:spLocks noGrp="1" noRot="1" noChangeAspect="1"/>
+          </p:cNvSpPr>
+          <p:nvPr>
+            <p:ph type="sldImg" idx="2"/>
+          </p:nvPr>
+        </p:nvSpPr>
+        <p:spPr>
+          <a:xfrm>
+            <a:off x="381000" y="685800"/>
+            <a:ext cx="6096000" cy="3429000"/>
+          </a:xfrm>
+          <a:custGeom>
+            <a:avLst/>
+            <a:gdLst/>
+            <a:ahLst/>
+            <a:cxnLst/>
+            <a:rect l="l" t="t" r="r" b="b"/>
+            <a:pathLst>
+              <a:path w="120000" h="120000" extrusionOk="0">
+                <a:moveTo>
+                  <a:pt x="0" y="0"/>
+                </a:moveTo>
+                <a:lnTo>
+                  <a:pt x="120000" y="0"/>
+                </a:lnTo>
+                <a:lnTo>
+                  <a:pt x="120000" y="120000"/>
+                </a:lnTo>
+                <a:lnTo>
+                  <a:pt x="0" y="120000"/>
+                </a:lnTo>
+                <a:close/>
+              </a:path>
+            </a:pathLst>
+          </a:custGeom>
+        </p:spPr>
+      </p:sp>
+      <p:sp>
+        <p:nvSpPr>
+          <p:cNvPr id="1347" name="Google Shape;1347;gd279b9a442_0_1447:notes"/>
+          <p:cNvSpPr txBox="1">
+            <a:spLocks noGrp="1"/>
+          </p:cNvSpPr>
+          <p:nvPr>
+            <p:ph type="body" idx="1"/>
+          </p:nvPr>
+        </p:nvSpPr>
+        <p:spPr>
+          <a:xfrm>
+            <a:off x="685800" y="4343400"/>
+            <a:ext cx="5486400" cy="4114800"/>
+          </a:xfrm>
+          <a:prstGeom prst="rect">
+            <a:avLst/>
+          </a:prstGeom>
+        </p:spPr>
+        <p:txBody>
+          <a:bodyPr spcFirstLastPara="1" wrap="square" lIns="91425" tIns="91425" rIns="91425" bIns="91425" anchor="t" anchorCtr="0">
+            <a:noAutofit/>
+          </a:bodyPr>
+          <a:lstStyle/>
+          <a:p>
+            <a:pPr marL="0" lvl="0" indent="0" algn="l" rtl="0">
+              <a:spcBef>
+                <a:spcPts val="0"/>
+              </a:spcBef>
+              <a:spcAft>
+                <a:spcPts val="0"/>
+              </a:spcAft>
+              <a:buNone/>
+            </a:pPr>
+            <a:endParaRPr/>
+          </a:p>
+        </p:txBody>
+      </p:sp>
+    </p:spTree>
+    <p:extLst>
+      <p:ext uri="{BB962C8B-B14F-4D97-AF65-F5344CB8AC3E}">
         <p14:creationId xmlns:p14="http://schemas.microsoft.com/office/powerpoint/2010/main" val="2751451732"/>
       </p:ext>
     </p:extLst>
@@ -1614,7 +1724,7 @@
 </p:notes>
 </file>
 
-<file path=ppt/notesSlides/notesSlide17.xml><?xml version="1.0" encoding="utf-8"?>
+<file path=ppt/notesSlides/notesSlide18.xml><?xml version="1.0" encoding="utf-8"?>
 <p:notes xmlns:a="http://schemas.openxmlformats.org/drawingml/2006/main" xmlns:r="http://schemas.openxmlformats.org/officeDocument/2006/relationships" xmlns:p="http://schemas.openxmlformats.org/presentationml/2006/main" showMasterSp="0" showMasterPhAnim="0">
   <p:cSld>
     <p:spTree>
@@ -1723,7 +1833,7 @@
 </p:notes>
 </file>
 
-<file path=ppt/notesSlides/notesSlide18.xml><?xml version="1.0" encoding="utf-8"?>
+<file path=ppt/notesSlides/notesSlide19.xml><?xml version="1.0" encoding="utf-8"?>
 <p:notes xmlns:a="http://schemas.openxmlformats.org/drawingml/2006/main" xmlns:r="http://schemas.openxmlformats.org/officeDocument/2006/relationships" xmlns:p="http://schemas.openxmlformats.org/presentationml/2006/main" showMasterSp="0" showMasterPhAnim="0">
   <p:cSld>
     <p:spTree>
@@ -23645,7 +23755,7 @@
                 <a:latin typeface="Quicksand"/>
                 <a:sym typeface="Quicksand"/>
               </a:rPr>
-              <a:t>RAVDESS + TESS + EMODB Datasets</a:t>
+              <a:t>RAVDESS + TESS + EMO-DB Datasets</a:t>
             </a:r>
           </a:p>
           <a:p>
@@ -24201,7 +24311,7 @@
         </p:nvSpPr>
         <p:spPr>
           <a:xfrm>
-            <a:off x="765530" y="637106"/>
+            <a:off x="866432" y="637106"/>
             <a:ext cx="7717500" cy="363000"/>
           </a:xfrm>
           <a:prstGeom prst="rect">
@@ -24225,7 +24335,7 @@
             </a:pPr>
             <a:r>
               <a:rPr lang="en" dirty="0"/>
-              <a:t>TEXT EMOTION DETECTION MODEL </a:t>
+              <a:t>TEXT EMOTION RECOGNITION TESTS</a:t>
             </a:r>
             <a:endParaRPr dirty="0"/>
           </a:p>
@@ -24408,6 +24518,529 @@
           </p:txBody>
         </p:sp>
       </p:grpSp>
+      <p:sp>
+        <p:nvSpPr>
+          <p:cNvPr id="4" name="Rectangle 3">
+            <a:extLst>
+              <a:ext uri="{FF2B5EF4-FFF2-40B4-BE49-F238E27FC236}">
+                <a16:creationId xmlns:a16="http://schemas.microsoft.com/office/drawing/2014/main" id="{32BA7A24-5DD9-2592-A2A2-2E60BFFF3C25}"/>
+              </a:ext>
+            </a:extLst>
+          </p:cNvPr>
+          <p:cNvSpPr/>
+          <p:nvPr/>
+        </p:nvSpPr>
+        <p:spPr>
+          <a:xfrm>
+            <a:off x="1363505" y="1440595"/>
+            <a:ext cx="6319359" cy="2893100"/>
+          </a:xfrm>
+          <a:prstGeom prst="rect">
+            <a:avLst/>
+          </a:prstGeom>
+        </p:spPr>
+        <p:txBody>
+          <a:bodyPr wrap="none">
+            <a:spAutoFit/>
+          </a:bodyPr>
+          <a:lstStyle/>
+          <a:p>
+            <a:r>
+              <a:rPr lang="it-IT" dirty="0" err="1">
+                <a:latin typeface="Quicksand" panose="020B0604020202020204" charset="0"/>
+              </a:rPr>
+              <a:t>We</a:t>
+            </a:r>
+            <a:r>
+              <a:rPr lang="it-IT" dirty="0">
+                <a:latin typeface="Quicksand" panose="020B0604020202020204" charset="0"/>
+              </a:rPr>
+              <a:t> </a:t>
+            </a:r>
+            <a:r>
+              <a:rPr lang="it-IT" dirty="0" err="1">
+                <a:latin typeface="Quicksand" panose="020B0604020202020204" charset="0"/>
+              </a:rPr>
+              <a:t>have</a:t>
+            </a:r>
+            <a:r>
+              <a:rPr lang="it-IT" dirty="0">
+                <a:latin typeface="Quicksand" panose="020B0604020202020204" charset="0"/>
+              </a:rPr>
+              <a:t> </a:t>
+            </a:r>
+            <a:r>
+              <a:rPr lang="it-IT" dirty="0" err="1">
+                <a:latin typeface="Quicksand" panose="020B0604020202020204" charset="0"/>
+              </a:rPr>
+              <a:t>performed</a:t>
+            </a:r>
+            <a:r>
+              <a:rPr lang="it-IT" dirty="0">
+                <a:latin typeface="Quicksand" panose="020B0604020202020204" charset="0"/>
+              </a:rPr>
+              <a:t> 4 </a:t>
+            </a:r>
+            <a:r>
+              <a:rPr lang="it-IT" dirty="0" err="1">
+                <a:latin typeface="Quicksand" panose="020B0604020202020204" charset="0"/>
+              </a:rPr>
+              <a:t>different</a:t>
+            </a:r>
+            <a:r>
+              <a:rPr lang="it-IT" dirty="0">
+                <a:latin typeface="Quicksand" panose="020B0604020202020204" charset="0"/>
+              </a:rPr>
+              <a:t> </a:t>
+            </a:r>
+            <a:r>
+              <a:rPr lang="it-IT" dirty="0" err="1">
+                <a:latin typeface="Quicksand" panose="020B0604020202020204" charset="0"/>
+              </a:rPr>
+              <a:t>tests</a:t>
+            </a:r>
+            <a:r>
+              <a:rPr lang="it-IT" dirty="0">
+                <a:latin typeface="Quicksand" panose="020B0604020202020204" charset="0"/>
+              </a:rPr>
+              <a:t> </a:t>
+            </a:r>
+            <a:r>
+              <a:rPr lang="it-IT" dirty="0" err="1">
+                <a:latin typeface="Quicksand" panose="020B0604020202020204" charset="0"/>
+              </a:rPr>
+              <a:t>using</a:t>
+            </a:r>
+            <a:r>
+              <a:rPr lang="it-IT" dirty="0">
+                <a:latin typeface="Quicksand" panose="020B0604020202020204" charset="0"/>
+              </a:rPr>
+              <a:t> </a:t>
+            </a:r>
+            <a:r>
+              <a:rPr lang="it-IT" dirty="0" err="1">
+                <a:latin typeface="Quicksand" panose="020B0604020202020204" charset="0"/>
+              </a:rPr>
+              <a:t>different</a:t>
+            </a:r>
+            <a:r>
+              <a:rPr lang="it-IT" dirty="0">
+                <a:latin typeface="Quicksand" panose="020B0604020202020204" charset="0"/>
+              </a:rPr>
+              <a:t> dataset </a:t>
+            </a:r>
+            <a:r>
+              <a:rPr lang="it-IT" dirty="0" err="1">
+                <a:latin typeface="Quicksand" panose="020B0604020202020204" charset="0"/>
+              </a:rPr>
+              <a:t>combinations</a:t>
+            </a:r>
+            <a:r>
+              <a:rPr lang="it-IT" dirty="0">
+                <a:latin typeface="Quicksand" panose="020B0604020202020204" charset="0"/>
+              </a:rPr>
+              <a:t>:</a:t>
+            </a:r>
+          </a:p>
+          <a:p>
+            <a:endParaRPr lang="it-IT" dirty="0">
+              <a:latin typeface="Quicksand" panose="020B0604020202020204" charset="0"/>
+            </a:endParaRPr>
+          </a:p>
+          <a:p>
+            <a:endParaRPr lang="it-IT" dirty="0">
+              <a:latin typeface="Quicksand" panose="020B0604020202020204" charset="0"/>
+            </a:endParaRPr>
+          </a:p>
+          <a:p>
+            <a:r>
+              <a:rPr lang="it-IT" b="1" dirty="0">
+                <a:latin typeface="Quicksand" panose="020B0604020202020204" charset="0"/>
+              </a:rPr>
+              <a:t>1) </a:t>
+            </a:r>
+            <a:r>
+              <a:rPr lang="it-IT" dirty="0">
+                <a:latin typeface="Quicksand" panose="020B0604020202020204" charset="0"/>
+              </a:rPr>
+              <a:t>WASSA + USER dataset for </a:t>
+            </a:r>
+            <a:r>
+              <a:rPr lang="it-IT" dirty="0" err="1">
+                <a:latin typeface="Quicksand" panose="020B0604020202020204" charset="0"/>
+              </a:rPr>
+              <a:t>train</a:t>
+            </a:r>
+            <a:r>
+              <a:rPr lang="it-IT" dirty="0">
+                <a:latin typeface="Quicksand" panose="020B0604020202020204" charset="0"/>
+              </a:rPr>
+              <a:t> and test </a:t>
+            </a:r>
+          </a:p>
+          <a:p>
+            <a:pPr marL="342900" indent="-342900">
+              <a:buAutoNum type="arabicParenR"/>
+            </a:pPr>
+            <a:endParaRPr lang="it-IT" dirty="0">
+              <a:latin typeface="Quicksand" panose="020B0604020202020204" charset="0"/>
+            </a:endParaRPr>
+          </a:p>
+          <a:p>
+            <a:endParaRPr lang="it-IT" dirty="0">
+              <a:latin typeface="Quicksand" panose="020B0604020202020204" charset="0"/>
+            </a:endParaRPr>
+          </a:p>
+          <a:p>
+            <a:r>
+              <a:rPr lang="it-IT" b="1" dirty="0">
+                <a:latin typeface="Quicksand" panose="020B0604020202020204" charset="0"/>
+              </a:rPr>
+              <a:t>2) </a:t>
+            </a:r>
+            <a:r>
+              <a:rPr lang="it-IT" dirty="0">
+                <a:latin typeface="Quicksand" panose="020B0604020202020204" charset="0"/>
+              </a:rPr>
+              <a:t>WASSA dataset for </a:t>
+            </a:r>
+            <a:r>
+              <a:rPr lang="it-IT" dirty="0" err="1">
+                <a:latin typeface="Quicksand" panose="020B0604020202020204" charset="0"/>
+              </a:rPr>
+              <a:t>train</a:t>
+            </a:r>
+            <a:r>
+              <a:rPr lang="it-IT" dirty="0">
+                <a:latin typeface="Quicksand" panose="020B0604020202020204" charset="0"/>
+              </a:rPr>
+              <a:t> and test </a:t>
+            </a:r>
+          </a:p>
+          <a:p>
+            <a:endParaRPr lang="it-IT" dirty="0">
+              <a:latin typeface="Quicksand" panose="020B0604020202020204" charset="0"/>
+            </a:endParaRPr>
+          </a:p>
+          <a:p>
+            <a:endParaRPr lang="it-IT" dirty="0">
+              <a:latin typeface="Quicksand" panose="020B0604020202020204" charset="0"/>
+            </a:endParaRPr>
+          </a:p>
+          <a:p>
+            <a:r>
+              <a:rPr lang="it-IT" b="1" dirty="0">
+                <a:latin typeface="Quicksand" panose="020B0604020202020204" charset="0"/>
+              </a:rPr>
+              <a:t>3) </a:t>
+            </a:r>
+            <a:r>
+              <a:rPr lang="it-IT" dirty="0">
+                <a:latin typeface="Quicksand" panose="020B0604020202020204" charset="0"/>
+              </a:rPr>
+              <a:t>USER dataset for </a:t>
+            </a:r>
+            <a:r>
+              <a:rPr lang="it-IT" dirty="0" err="1">
+                <a:latin typeface="Quicksand" panose="020B0604020202020204" charset="0"/>
+              </a:rPr>
+              <a:t>train</a:t>
+            </a:r>
+            <a:r>
+              <a:rPr lang="it-IT" dirty="0">
+                <a:latin typeface="Quicksand" panose="020B0604020202020204" charset="0"/>
+              </a:rPr>
+              <a:t> and test</a:t>
+            </a:r>
+          </a:p>
+          <a:p>
+            <a:endParaRPr lang="it-IT" dirty="0">
+              <a:latin typeface="Quicksand" panose="020B0604020202020204" charset="0"/>
+            </a:endParaRPr>
+          </a:p>
+          <a:p>
+            <a:endParaRPr lang="it-IT" dirty="0">
+              <a:latin typeface="Quicksand" panose="020B0604020202020204" charset="0"/>
+            </a:endParaRPr>
+          </a:p>
+          <a:p>
+            <a:r>
+              <a:rPr lang="it-IT" b="1" dirty="0">
+                <a:latin typeface="Quicksand" panose="020B0604020202020204" charset="0"/>
+              </a:rPr>
+              <a:t>4) </a:t>
+            </a:r>
+            <a:r>
+              <a:rPr lang="it-IT" dirty="0">
+                <a:latin typeface="Quicksand" panose="020B0604020202020204" charset="0"/>
+              </a:rPr>
+              <a:t>WASSA dataset for </a:t>
+            </a:r>
+            <a:r>
+              <a:rPr lang="it-IT" dirty="0" err="1">
+                <a:latin typeface="Quicksand" panose="020B0604020202020204" charset="0"/>
+              </a:rPr>
+              <a:t>train</a:t>
+            </a:r>
+            <a:r>
+              <a:rPr lang="it-IT" dirty="0">
+                <a:latin typeface="Quicksand" panose="020B0604020202020204" charset="0"/>
+              </a:rPr>
+              <a:t> and USER dataset for test</a:t>
+            </a:r>
+            <a:endParaRPr lang="en-IT" dirty="0"/>
+          </a:p>
+        </p:txBody>
+      </p:sp>
+    </p:spTree>
+    <p:extLst>
+      <p:ext uri="{BB962C8B-B14F-4D97-AF65-F5344CB8AC3E}">
+        <p14:creationId xmlns:p14="http://schemas.microsoft.com/office/powerpoint/2010/main" val="1482529216"/>
+      </p:ext>
+    </p:extLst>
+  </p:cSld>
+  <p:clrMapOvr>
+    <a:masterClrMapping/>
+  </p:clrMapOvr>
+</p:sld>
+</file>
+
+<file path=ppt/slides/slide16.xml><?xml version="1.0" encoding="utf-8"?>
+<p:sld xmlns:a="http://schemas.openxmlformats.org/drawingml/2006/main" xmlns:r="http://schemas.openxmlformats.org/officeDocument/2006/relationships" xmlns:p="http://schemas.openxmlformats.org/presentationml/2006/main">
+  <p:cSld>
+    <p:spTree>
+      <p:nvGrpSpPr>
+        <p:cNvPr id="1" name="Shape 1348"/>
+        <p:cNvGrpSpPr/>
+        <p:nvPr/>
+      </p:nvGrpSpPr>
+      <p:grpSpPr>
+        <a:xfrm>
+          <a:off x="0" y="0"/>
+          <a:ext cx="0" cy="0"/>
+          <a:chOff x="0" y="0"/>
+          <a:chExt cx="0" cy="0"/>
+        </a:xfrm>
+      </p:grpSpPr>
+      <p:sp>
+        <p:nvSpPr>
+          <p:cNvPr id="1350" name="Google Shape;1350;p88"/>
+          <p:cNvSpPr txBox="1">
+            <a:spLocks noGrp="1"/>
+          </p:cNvSpPr>
+          <p:nvPr>
+            <p:ph type="title"/>
+          </p:nvPr>
+        </p:nvSpPr>
+        <p:spPr>
+          <a:xfrm>
+            <a:off x="765530" y="637106"/>
+            <a:ext cx="7717500" cy="363000"/>
+          </a:xfrm>
+          <a:prstGeom prst="rect">
+            <a:avLst/>
+          </a:prstGeom>
+        </p:spPr>
+        <p:txBody>
+          <a:bodyPr spcFirstLastPara="1" wrap="square" lIns="91425" tIns="91425" rIns="91425" bIns="91425" anchor="ctr" anchorCtr="0">
+            <a:noAutofit/>
+          </a:bodyPr>
+          <a:lstStyle/>
+          <a:p>
+            <a:pPr marL="0" lvl="0" indent="0" algn="ctr" rtl="0">
+              <a:spcBef>
+                <a:spcPts val="0"/>
+              </a:spcBef>
+              <a:spcAft>
+                <a:spcPts val="0"/>
+              </a:spcAft>
+              <a:buNone/>
+            </a:pPr>
+            <a:r>
+              <a:rPr lang="en" dirty="0"/>
+              <a:t>TEXT EMOTION DETECTION RESULTS </a:t>
+            </a:r>
+            <a:endParaRPr dirty="0"/>
+          </a:p>
+        </p:txBody>
+      </p:sp>
+      <p:grpSp>
+        <p:nvGrpSpPr>
+          <p:cNvPr id="1351" name="Google Shape;1351;p88"/>
+          <p:cNvGrpSpPr/>
+          <p:nvPr/>
+        </p:nvGrpSpPr>
+        <p:grpSpPr>
+          <a:xfrm rot="-608266">
+            <a:off x="615603" y="252146"/>
+            <a:ext cx="692367" cy="692431"/>
+            <a:chOff x="4231275" y="1599750"/>
+            <a:chExt cx="692428" cy="692493"/>
+          </a:xfrm>
+        </p:grpSpPr>
+        <p:sp>
+          <p:nvSpPr>
+            <p:cNvPr id="1352" name="Google Shape;1352;p88"/>
+            <p:cNvSpPr/>
+            <p:nvPr/>
+          </p:nvSpPr>
+          <p:spPr>
+            <a:xfrm>
+              <a:off x="4231275" y="1599750"/>
+              <a:ext cx="692428" cy="692493"/>
+            </a:xfrm>
+            <a:custGeom>
+              <a:avLst/>
+              <a:gdLst/>
+              <a:ahLst/>
+              <a:cxnLst/>
+              <a:rect l="l" t="t" r="r" b="b"/>
+              <a:pathLst>
+                <a:path w="8177" h="8178" fill="none" extrusionOk="0">
+                  <a:moveTo>
+                    <a:pt x="7721" y="3223"/>
+                  </a:moveTo>
+                  <a:cubicBezTo>
+                    <a:pt x="8177" y="5229"/>
+                    <a:pt x="6961" y="7235"/>
+                    <a:pt x="4955" y="7721"/>
+                  </a:cubicBezTo>
+                  <a:cubicBezTo>
+                    <a:pt x="2949" y="8177"/>
+                    <a:pt x="943" y="6961"/>
+                    <a:pt x="487" y="4955"/>
+                  </a:cubicBezTo>
+                  <a:cubicBezTo>
+                    <a:pt x="0" y="2949"/>
+                    <a:pt x="1247" y="943"/>
+                    <a:pt x="3222" y="457"/>
+                  </a:cubicBezTo>
+                  <a:cubicBezTo>
+                    <a:pt x="5229" y="1"/>
+                    <a:pt x="7235" y="1247"/>
+                    <a:pt x="7721" y="3223"/>
+                  </a:cubicBezTo>
+                  <a:close/>
+                </a:path>
+              </a:pathLst>
+            </a:custGeom>
+            <a:noFill/>
+            <a:ln w="9525" cap="flat" cmpd="sng">
+              <a:solidFill>
+                <a:schemeClr val="accent5"/>
+              </a:solidFill>
+              <a:prstDash val="solid"/>
+              <a:miter lim="30395"/>
+              <a:headEnd type="none" w="sm" len="sm"/>
+              <a:tailEnd type="none" w="sm" len="sm"/>
+            </a:ln>
+          </p:spPr>
+          <p:txBody>
+            <a:bodyPr spcFirstLastPara="1" wrap="square" lIns="91425" tIns="91425" rIns="91425" bIns="91425" anchor="ctr" anchorCtr="0">
+              <a:noAutofit/>
+            </a:bodyPr>
+            <a:lstStyle/>
+            <a:p>
+              <a:pPr marL="0" lvl="0" indent="0" algn="l" rtl="0">
+                <a:spcBef>
+                  <a:spcPts val="0"/>
+                </a:spcBef>
+                <a:spcAft>
+                  <a:spcPts val="0"/>
+                </a:spcAft>
+                <a:buNone/>
+              </a:pPr>
+              <a:endParaRPr/>
+            </a:p>
+          </p:txBody>
+        </p:sp>
+        <p:sp>
+          <p:nvSpPr>
+            <p:cNvPr id="1353" name="Google Shape;1353;p88"/>
+            <p:cNvSpPr/>
+            <p:nvPr/>
+          </p:nvSpPr>
+          <p:spPr>
+            <a:xfrm>
+              <a:off x="4411473" y="1759369"/>
+              <a:ext cx="332115" cy="342351"/>
+            </a:xfrm>
+            <a:custGeom>
+              <a:avLst/>
+              <a:gdLst/>
+              <a:ahLst/>
+              <a:cxnLst/>
+              <a:rect l="l" t="t" r="r" b="b"/>
+              <a:pathLst>
+                <a:path w="3922" h="4043" fill="none" extrusionOk="0">
+                  <a:moveTo>
+                    <a:pt x="3921" y="4043"/>
+                  </a:moveTo>
+                  <a:cubicBezTo>
+                    <a:pt x="3921" y="3161"/>
+                    <a:pt x="3344" y="2219"/>
+                    <a:pt x="2523" y="1915"/>
+                  </a:cubicBezTo>
+                  <a:cubicBezTo>
+                    <a:pt x="2827" y="1733"/>
+                    <a:pt x="3009" y="1399"/>
+                    <a:pt x="3009" y="1034"/>
+                  </a:cubicBezTo>
+                  <a:cubicBezTo>
+                    <a:pt x="3009" y="456"/>
+                    <a:pt x="2553" y="0"/>
+                    <a:pt x="1976" y="0"/>
+                  </a:cubicBezTo>
+                  <a:cubicBezTo>
+                    <a:pt x="1398" y="0"/>
+                    <a:pt x="912" y="456"/>
+                    <a:pt x="912" y="1034"/>
+                  </a:cubicBezTo>
+                  <a:cubicBezTo>
+                    <a:pt x="912" y="1399"/>
+                    <a:pt x="1125" y="1733"/>
+                    <a:pt x="1398" y="1915"/>
+                  </a:cubicBezTo>
+                  <a:cubicBezTo>
+                    <a:pt x="608" y="2219"/>
+                    <a:pt x="0" y="3161"/>
+                    <a:pt x="0" y="4043"/>
+                  </a:cubicBezTo>
+                  <a:close/>
+                </a:path>
+              </a:pathLst>
+            </a:custGeom>
+            <a:noFill/>
+            <a:ln w="9525" cap="flat" cmpd="sng">
+              <a:solidFill>
+                <a:schemeClr val="accent5"/>
+              </a:solidFill>
+              <a:prstDash val="solid"/>
+              <a:miter lim="30395"/>
+              <a:headEnd type="none" w="sm" len="sm"/>
+              <a:tailEnd type="none" w="sm" len="sm"/>
+            </a:ln>
+          </p:spPr>
+          <p:txBody>
+            <a:bodyPr spcFirstLastPara="1" wrap="square" lIns="91425" tIns="91425" rIns="91425" bIns="91425" anchor="ctr" anchorCtr="0">
+              <a:noAutofit/>
+            </a:bodyPr>
+            <a:lstStyle/>
+            <a:p>
+              <a:pPr marL="0" lvl="0" indent="0" algn="l" rtl="0">
+                <a:spcBef>
+                  <a:spcPts val="0"/>
+                </a:spcBef>
+                <a:spcAft>
+                  <a:spcPts val="0"/>
+                </a:spcAft>
+                <a:buNone/>
+              </a:pPr>
+              <a:endParaRPr/>
+            </a:p>
+          </p:txBody>
+        </p:sp>
+      </p:grpSp>
       <p:graphicFrame>
         <p:nvGraphicFramePr>
           <p:cNvPr id="3" name="Table 4">
@@ -24420,16 +25053,10 @@
           <p:cNvGraphicFramePr>
             <a:graphicFrameLocks noGrp="1"/>
           </p:cNvGraphicFramePr>
-          <p:nvPr>
-            <p:extLst>
-              <p:ext uri="{D42A27DB-BD31-4B8C-83A1-F6EECF244321}">
-                <p14:modId xmlns:p14="http://schemas.microsoft.com/office/powerpoint/2010/main" val="2506003190"/>
-              </p:ext>
-            </p:extLst>
-          </p:nvPr>
+          <p:nvPr/>
         </p:nvGraphicFramePr>
         <p:xfrm>
-          <a:off x="867657" y="1570990"/>
+          <a:off x="867657" y="1221348"/>
           <a:ext cx="7408685" cy="2001520"/>
         </p:xfrm>
         <a:graphic>
@@ -24583,7 +25210,7 @@
                     <a:p>
                       <a:pPr algn="ctr"/>
                       <a:r>
-                        <a:rPr lang="en-IT" sz="1400" dirty="0">
+                        <a:rPr lang="en-IT" sz="1400" b="1" dirty="0">
                           <a:latin typeface="Quicksand" panose="020B0604020202020204" charset="0"/>
                         </a:rPr>
                         <a:t>0.51</a:t>
@@ -24911,6 +25538,245 @@
           </a:graphicData>
         </a:graphic>
       </p:graphicFrame>
+      <p:sp>
+        <p:nvSpPr>
+          <p:cNvPr id="2" name="TextBox 1">
+            <a:extLst>
+              <a:ext uri="{FF2B5EF4-FFF2-40B4-BE49-F238E27FC236}">
+                <a16:creationId xmlns:a16="http://schemas.microsoft.com/office/drawing/2014/main" id="{865347D8-D22F-A974-8AF6-B070A89148ED}"/>
+              </a:ext>
+            </a:extLst>
+          </p:cNvPr>
+          <p:cNvSpPr txBox="1"/>
+          <p:nvPr/>
+        </p:nvSpPr>
+        <p:spPr>
+          <a:xfrm>
+            <a:off x="867657" y="3325827"/>
+            <a:ext cx="7048724" cy="523220"/>
+          </a:xfrm>
+          <a:prstGeom prst="rect">
+            <a:avLst/>
+          </a:prstGeom>
+          <a:noFill/>
+        </p:spPr>
+        <p:txBody>
+          <a:bodyPr wrap="none" rtlCol="0">
+            <a:spAutoFit/>
+          </a:bodyPr>
+          <a:lstStyle/>
+          <a:p>
+            <a:pPr marL="285750" indent="-285750">
+              <a:buFont typeface="Arial" panose="020B0604020202020204" pitchFamily="34" charset="0"/>
+              <a:buChar char="•"/>
+            </a:pPr>
+            <a:r>
+              <a:rPr lang="it-IT" dirty="0">
+                <a:latin typeface="Quicksand" panose="020B0604020202020204" charset="0"/>
+              </a:rPr>
+              <a:t>Total </a:t>
+            </a:r>
+            <a:r>
+              <a:rPr lang="it-IT" dirty="0" err="1">
+                <a:latin typeface="Quicksand" panose="020B0604020202020204" charset="0"/>
+              </a:rPr>
+              <a:t>train</a:t>
+            </a:r>
+            <a:r>
+              <a:rPr lang="it-IT" dirty="0">
+                <a:latin typeface="Quicksand" panose="020B0604020202020204" charset="0"/>
+              </a:rPr>
+              <a:t> user labels (after </a:t>
+            </a:r>
+            <a:r>
+              <a:rPr lang="it-IT" dirty="0" err="1">
+                <a:latin typeface="Quicksand" panose="020B0604020202020204" charset="0"/>
+              </a:rPr>
+              <a:t>undersampling</a:t>
+            </a:r>
+            <a:r>
+              <a:rPr lang="it-IT" dirty="0">
+                <a:latin typeface="Quicksand" panose="020B0604020202020204" charset="0"/>
+              </a:rPr>
+              <a:t>): 220 </a:t>
+            </a:r>
+            <a:r>
+              <a:rPr lang="it-IT" dirty="0" err="1">
+                <a:latin typeface="Quicksand" panose="020B0604020202020204" charset="0"/>
+              </a:rPr>
+              <a:t>instances</a:t>
+            </a:r>
+            <a:r>
+              <a:rPr lang="it-IT" dirty="0">
+                <a:latin typeface="Quicksand" panose="020B0604020202020204" charset="0"/>
+              </a:rPr>
+              <a:t> -&gt; 44 for </a:t>
+            </a:r>
+            <a:r>
+              <a:rPr lang="it-IT" dirty="0" err="1">
+                <a:latin typeface="Quicksand" panose="020B0604020202020204" charset="0"/>
+              </a:rPr>
+              <a:t>each</a:t>
+            </a:r>
+            <a:r>
+              <a:rPr lang="it-IT" dirty="0">
+                <a:latin typeface="Quicksand" panose="020B0604020202020204" charset="0"/>
+              </a:rPr>
+              <a:t> class</a:t>
+            </a:r>
+          </a:p>
+          <a:p>
+            <a:pPr marL="285750" indent="-285750">
+              <a:buFont typeface="Arial" panose="020B0604020202020204" pitchFamily="34" charset="0"/>
+              <a:buChar char="•"/>
+            </a:pPr>
+            <a:r>
+              <a:rPr lang="it-IT" dirty="0">
+                <a:latin typeface="Quicksand" panose="020B0604020202020204" charset="0"/>
+              </a:rPr>
+              <a:t>Total test user labels: 72 </a:t>
+            </a:r>
+            <a:r>
+              <a:rPr lang="it-IT" dirty="0" err="1">
+                <a:latin typeface="Quicksand" panose="020B0604020202020204" charset="0"/>
+              </a:rPr>
+              <a:t>instances</a:t>
+            </a:r>
+            <a:endParaRPr lang="en-IT" dirty="0"/>
+          </a:p>
+        </p:txBody>
+      </p:sp>
+      <p:sp>
+        <p:nvSpPr>
+          <p:cNvPr id="4" name="TextBox 3">
+            <a:extLst>
+              <a:ext uri="{FF2B5EF4-FFF2-40B4-BE49-F238E27FC236}">
+                <a16:creationId xmlns:a16="http://schemas.microsoft.com/office/drawing/2014/main" id="{8881AC35-6AB8-1E30-E273-303780A70C99}"/>
+              </a:ext>
+            </a:extLst>
+          </p:cNvPr>
+          <p:cNvSpPr txBox="1"/>
+          <p:nvPr/>
+        </p:nvSpPr>
+        <p:spPr>
+          <a:xfrm>
+            <a:off x="867657" y="3875451"/>
+            <a:ext cx="3276859" cy="954107"/>
+          </a:xfrm>
+          <a:prstGeom prst="rect">
+            <a:avLst/>
+          </a:prstGeom>
+          <a:noFill/>
+        </p:spPr>
+        <p:txBody>
+          <a:bodyPr wrap="none" rtlCol="0">
+            <a:spAutoFit/>
+          </a:bodyPr>
+          <a:lstStyle/>
+          <a:p>
+            <a:r>
+              <a:rPr lang="it-IT" b="1" dirty="0" err="1">
+                <a:latin typeface="Quicksand" panose="020B0604020202020204" charset="0"/>
+              </a:rPr>
+              <a:t>Bias</a:t>
+            </a:r>
+            <a:r>
+              <a:rPr lang="it-IT" b="1" dirty="0">
+                <a:latin typeface="Quicksand" panose="020B0604020202020204" charset="0"/>
+              </a:rPr>
+              <a:t> </a:t>
+            </a:r>
+            <a:r>
+              <a:rPr lang="it-IT" b="1" dirty="0" err="1">
+                <a:latin typeface="Quicksand" panose="020B0604020202020204" charset="0"/>
+              </a:rPr>
+              <a:t>example</a:t>
+            </a:r>
+            <a:r>
+              <a:rPr lang="it-IT" b="1" dirty="0">
+                <a:latin typeface="Quicksand" panose="020B0604020202020204" charset="0"/>
+              </a:rPr>
+              <a:t>: </a:t>
+            </a:r>
+          </a:p>
+          <a:p>
+            <a:endParaRPr lang="it-IT" dirty="0">
+              <a:latin typeface="Quicksand" panose="020B0604020202020204" charset="0"/>
+            </a:endParaRPr>
+          </a:p>
+          <a:p>
+            <a:r>
+              <a:rPr lang="it-IT" dirty="0">
+                <a:latin typeface="Quicksand" panose="020B0604020202020204" charset="0"/>
+              </a:rPr>
+              <a:t>WASSA dataset -&gt; “DAMN!“ = </a:t>
+            </a:r>
+            <a:r>
+              <a:rPr lang="it-IT" b="1" dirty="0" err="1">
+                <a:latin typeface="Quicksand" panose="020B0604020202020204" charset="0"/>
+              </a:rPr>
+              <a:t>Neutral</a:t>
+            </a:r>
+            <a:endParaRPr lang="it-IT" b="1" dirty="0">
+              <a:latin typeface="Quicksand" panose="020B0604020202020204" charset="0"/>
+            </a:endParaRPr>
+          </a:p>
+          <a:p>
+            <a:r>
+              <a:rPr lang="it-IT" dirty="0">
+                <a:latin typeface="Quicksand" panose="020B0604020202020204" charset="0"/>
+              </a:rPr>
+              <a:t> </a:t>
+            </a:r>
+            <a:endParaRPr lang="en-IT" dirty="0"/>
+          </a:p>
+        </p:txBody>
+      </p:sp>
+      <p:sp>
+        <p:nvSpPr>
+          <p:cNvPr id="5" name="Rectangle 4">
+            <a:extLst>
+              <a:ext uri="{FF2B5EF4-FFF2-40B4-BE49-F238E27FC236}">
+                <a16:creationId xmlns:a16="http://schemas.microsoft.com/office/drawing/2014/main" id="{F2989ADB-F0C5-7B6C-002F-995C40EC88EF}"/>
+              </a:ext>
+            </a:extLst>
+          </p:cNvPr>
+          <p:cNvSpPr/>
+          <p:nvPr/>
+        </p:nvSpPr>
+        <p:spPr>
+          <a:xfrm>
+            <a:off x="4571999" y="4295860"/>
+            <a:ext cx="3156633" cy="307777"/>
+          </a:xfrm>
+          <a:prstGeom prst="rect">
+            <a:avLst/>
+          </a:prstGeom>
+        </p:spPr>
+        <p:txBody>
+          <a:bodyPr wrap="none">
+            <a:spAutoFit/>
+          </a:bodyPr>
+          <a:lstStyle/>
+          <a:p>
+            <a:r>
+              <a:rPr lang="it-IT" dirty="0">
+                <a:latin typeface="Quicksand" panose="020B0604020202020204" charset="0"/>
+              </a:rPr>
+              <a:t>USER dataset -&gt; “DAMN!“ = </a:t>
+            </a:r>
+            <a:r>
+              <a:rPr lang="it-IT" b="1" dirty="0" err="1">
+                <a:latin typeface="Quicksand" panose="020B0604020202020204" charset="0"/>
+              </a:rPr>
+              <a:t>Sadness</a:t>
+            </a:r>
+            <a:endParaRPr lang="it-IT" b="1" dirty="0">
+              <a:latin typeface="Quicksand" panose="020B0604020202020204" charset="0"/>
+            </a:endParaRPr>
+          </a:p>
+        </p:txBody>
+      </p:sp>
     </p:spTree>
     <p:extLst>
       <p:ext uri="{BB962C8B-B14F-4D97-AF65-F5344CB8AC3E}">
@@ -24924,7 +25790,7 @@
 </p:sld>
 </file>
 
-<file path=ppt/slides/slide16.xml><?xml version="1.0" encoding="utf-8"?>
+<file path=ppt/slides/slide17.xml><?xml version="1.0" encoding="utf-8"?>
 <p:sld xmlns:a="http://schemas.openxmlformats.org/drawingml/2006/main" xmlns:r="http://schemas.openxmlformats.org/officeDocument/2006/relationships" xmlns:p="http://schemas.openxmlformats.org/presentationml/2006/main">
   <p:cSld>
     <p:spTree>
@@ -25421,7 +26287,7 @@
 </p:sld>
 </file>
 
-<file path=ppt/slides/slide17.xml><?xml version="1.0" encoding="utf-8"?>
+<file path=ppt/slides/slide18.xml><?xml version="1.0" encoding="utf-8"?>
 <p:sld xmlns:a="http://schemas.openxmlformats.org/drawingml/2006/main" xmlns:r="http://schemas.openxmlformats.org/officeDocument/2006/relationships" xmlns:p="http://schemas.openxmlformats.org/presentationml/2006/main">
   <p:cSld>
     <p:spTree>
@@ -26247,7 +27113,7 @@
 </p:sld>
 </file>
 
-<file path=ppt/slides/slide18.xml><?xml version="1.0" encoding="utf-8"?>
+<file path=ppt/slides/slide19.xml><?xml version="1.0" encoding="utf-8"?>
 <p:sld xmlns:a="http://schemas.openxmlformats.org/drawingml/2006/main" xmlns:r="http://schemas.openxmlformats.org/officeDocument/2006/relationships" xmlns:p="http://schemas.openxmlformats.org/presentationml/2006/main">
   <p:cSld>
     <p:spTree>
@@ -26947,7 +27813,1514 @@
 </p:sld>
 </file>
 
-<file path=ppt/slides/slide19.xml><?xml version="1.0" encoding="utf-8"?>
+<file path=ppt/slides/slide2.xml><?xml version="1.0" encoding="utf-8"?>
+<p:sld xmlns:a="http://schemas.openxmlformats.org/drawingml/2006/main" xmlns:r="http://schemas.openxmlformats.org/officeDocument/2006/relationships" xmlns:p="http://schemas.openxmlformats.org/presentationml/2006/main">
+  <p:cSld>
+    <p:spTree>
+      <p:nvGrpSpPr>
+        <p:cNvPr id="1" name="Shape 1357"/>
+        <p:cNvGrpSpPr/>
+        <p:nvPr/>
+      </p:nvGrpSpPr>
+      <p:grpSpPr>
+        <a:xfrm>
+          <a:off x="0" y="0"/>
+          <a:ext cx="0" cy="0"/>
+          <a:chOff x="0" y="0"/>
+          <a:chExt cx="0" cy="0"/>
+        </a:xfrm>
+      </p:grpSpPr>
+      <p:sp>
+        <p:nvSpPr>
+          <p:cNvPr id="1358" name="Google Shape;1358;p89"/>
+          <p:cNvSpPr/>
+          <p:nvPr/>
+        </p:nvSpPr>
+        <p:spPr>
+          <a:xfrm>
+            <a:off x="1068701" y="3102202"/>
+            <a:ext cx="822886" cy="822886"/>
+          </a:xfrm>
+          <a:custGeom>
+            <a:avLst/>
+            <a:gdLst/>
+            <a:ahLst/>
+            <a:cxnLst/>
+            <a:rect l="l" t="t" r="r" b="b"/>
+            <a:pathLst>
+              <a:path w="16384" h="16384" extrusionOk="0">
+                <a:moveTo>
+                  <a:pt x="5198" y="16384"/>
+                </a:moveTo>
+                <a:cubicBezTo>
+                  <a:pt x="2341" y="16384"/>
+                  <a:pt x="1" y="14043"/>
+                  <a:pt x="1" y="11186"/>
+                </a:cubicBezTo>
+                <a:lnTo>
+                  <a:pt x="1" y="5198"/>
+                </a:lnTo>
+                <a:cubicBezTo>
+                  <a:pt x="1" y="2341"/>
+                  <a:pt x="2341" y="1"/>
+                  <a:pt x="5198" y="1"/>
+                </a:cubicBezTo>
+                <a:lnTo>
+                  <a:pt x="11186" y="1"/>
+                </a:lnTo>
+                <a:cubicBezTo>
+                  <a:pt x="14043" y="1"/>
+                  <a:pt x="16384" y="2341"/>
+                  <a:pt x="16384" y="5198"/>
+                </a:cubicBezTo>
+                <a:lnTo>
+                  <a:pt x="16384" y="11186"/>
+                </a:lnTo>
+                <a:cubicBezTo>
+                  <a:pt x="16384" y="14043"/>
+                  <a:pt x="14043" y="16384"/>
+                  <a:pt x="11186" y="16384"/>
+                </a:cubicBezTo>
+                <a:close/>
+              </a:path>
+            </a:pathLst>
+          </a:custGeom>
+          <a:gradFill>
+            <a:gsLst>
+              <a:gs pos="0">
+                <a:schemeClr val="accent2"/>
+              </a:gs>
+              <a:gs pos="100000">
+                <a:schemeClr val="accent3"/>
+              </a:gs>
+            </a:gsLst>
+            <a:lin ang="8100019" scaled="0"/>
+          </a:gradFill>
+          <a:ln w="9525" cap="flat" cmpd="sng">
+            <a:solidFill>
+              <a:schemeClr val="lt1"/>
+            </a:solidFill>
+            <a:prstDash val="solid"/>
+            <a:round/>
+            <a:headEnd type="none" w="sm" len="sm"/>
+            <a:tailEnd type="none" w="sm" len="sm"/>
+          </a:ln>
+        </p:spPr>
+        <p:txBody>
+          <a:bodyPr spcFirstLastPara="1" wrap="square" lIns="91425" tIns="91425" rIns="91425" bIns="91425" anchor="ctr" anchorCtr="0">
+            <a:noAutofit/>
+          </a:bodyPr>
+          <a:lstStyle/>
+          <a:p>
+            <a:pPr marL="0" marR="0" lvl="0" indent="0" algn="l" defTabSz="914400" rtl="0" eaLnBrk="1" fontAlgn="auto" latinLnBrk="0" hangingPunct="1">
+              <a:lnSpc>
+                <a:spcPct val="100000"/>
+              </a:lnSpc>
+              <a:spcBef>
+                <a:spcPts val="0"/>
+              </a:spcBef>
+              <a:spcAft>
+                <a:spcPts val="0"/>
+              </a:spcAft>
+              <a:buClr>
+                <a:srgbClr val="000000"/>
+              </a:buClr>
+              <a:buSzTx/>
+              <a:buFont typeface="Arial"/>
+              <a:buNone/>
+              <a:tabLst/>
+              <a:defRPr/>
+            </a:pPr>
+            <a:endParaRPr kumimoji="0" sz="1400" b="0" i="0" u="none" strike="noStrike" kern="0" cap="none" spc="0" normalizeH="0" baseline="0" noProof="0">
+              <a:ln>
+                <a:noFill/>
+              </a:ln>
+              <a:solidFill>
+                <a:srgbClr val="000000"/>
+              </a:solidFill>
+              <a:effectLst/>
+              <a:uLnTx/>
+              <a:uFillTx/>
+              <a:latin typeface="Arial"/>
+              <a:cs typeface="Arial"/>
+              <a:sym typeface="Arial"/>
+            </a:endParaRPr>
+          </a:p>
+        </p:txBody>
+      </p:sp>
+      <p:sp>
+        <p:nvSpPr>
+          <p:cNvPr id="1359" name="Google Shape;1359;p89"/>
+          <p:cNvSpPr/>
+          <p:nvPr/>
+        </p:nvSpPr>
+        <p:spPr>
+          <a:xfrm>
+            <a:off x="4868263" y="3102202"/>
+            <a:ext cx="822886" cy="822886"/>
+          </a:xfrm>
+          <a:custGeom>
+            <a:avLst/>
+            <a:gdLst/>
+            <a:ahLst/>
+            <a:cxnLst/>
+            <a:rect l="l" t="t" r="r" b="b"/>
+            <a:pathLst>
+              <a:path w="16384" h="16384" extrusionOk="0">
+                <a:moveTo>
+                  <a:pt x="5198" y="16384"/>
+                </a:moveTo>
+                <a:cubicBezTo>
+                  <a:pt x="2341" y="16384"/>
+                  <a:pt x="1" y="14043"/>
+                  <a:pt x="1" y="11186"/>
+                </a:cubicBezTo>
+                <a:lnTo>
+                  <a:pt x="1" y="5198"/>
+                </a:lnTo>
+                <a:cubicBezTo>
+                  <a:pt x="1" y="2341"/>
+                  <a:pt x="2341" y="1"/>
+                  <a:pt x="5198" y="1"/>
+                </a:cubicBezTo>
+                <a:lnTo>
+                  <a:pt x="11186" y="1"/>
+                </a:lnTo>
+                <a:cubicBezTo>
+                  <a:pt x="14043" y="1"/>
+                  <a:pt x="16384" y="2341"/>
+                  <a:pt x="16384" y="5198"/>
+                </a:cubicBezTo>
+                <a:lnTo>
+                  <a:pt x="16384" y="11186"/>
+                </a:lnTo>
+                <a:cubicBezTo>
+                  <a:pt x="16384" y="14043"/>
+                  <a:pt x="14043" y="16384"/>
+                  <a:pt x="11186" y="16384"/>
+                </a:cubicBezTo>
+                <a:close/>
+              </a:path>
+            </a:pathLst>
+          </a:custGeom>
+          <a:gradFill>
+            <a:gsLst>
+              <a:gs pos="0">
+                <a:schemeClr val="accent2"/>
+              </a:gs>
+              <a:gs pos="100000">
+                <a:schemeClr val="accent3"/>
+              </a:gs>
+            </a:gsLst>
+            <a:lin ang="8100019" scaled="0"/>
+          </a:gradFill>
+          <a:ln w="9525" cap="flat" cmpd="sng">
+            <a:solidFill>
+              <a:schemeClr val="lt1"/>
+            </a:solidFill>
+            <a:prstDash val="solid"/>
+            <a:round/>
+            <a:headEnd type="none" w="sm" len="sm"/>
+            <a:tailEnd type="none" w="sm" len="sm"/>
+          </a:ln>
+        </p:spPr>
+        <p:txBody>
+          <a:bodyPr spcFirstLastPara="1" wrap="square" lIns="91425" tIns="91425" rIns="91425" bIns="91425" anchor="ctr" anchorCtr="0">
+            <a:noAutofit/>
+          </a:bodyPr>
+          <a:lstStyle/>
+          <a:p>
+            <a:pPr marL="0" marR="0" lvl="0" indent="0" algn="l" defTabSz="914400" rtl="0" eaLnBrk="1" fontAlgn="auto" latinLnBrk="0" hangingPunct="1">
+              <a:lnSpc>
+                <a:spcPct val="100000"/>
+              </a:lnSpc>
+              <a:spcBef>
+                <a:spcPts val="0"/>
+              </a:spcBef>
+              <a:spcAft>
+                <a:spcPts val="0"/>
+              </a:spcAft>
+              <a:buClr>
+                <a:srgbClr val="000000"/>
+              </a:buClr>
+              <a:buSzTx/>
+              <a:buFont typeface="Arial"/>
+              <a:buNone/>
+              <a:tabLst/>
+              <a:defRPr/>
+            </a:pPr>
+            <a:endParaRPr kumimoji="0" sz="1400" b="0" i="0" u="none" strike="noStrike" kern="0" cap="none" spc="0" normalizeH="0" baseline="0" noProof="0">
+              <a:ln>
+                <a:noFill/>
+              </a:ln>
+              <a:solidFill>
+                <a:srgbClr val="000000"/>
+              </a:solidFill>
+              <a:effectLst/>
+              <a:uLnTx/>
+              <a:uFillTx/>
+              <a:latin typeface="Arial"/>
+              <a:cs typeface="Arial"/>
+              <a:sym typeface="Arial"/>
+            </a:endParaRPr>
+          </a:p>
+        </p:txBody>
+      </p:sp>
+      <p:sp>
+        <p:nvSpPr>
+          <p:cNvPr id="1360" name="Google Shape;1360;p89"/>
+          <p:cNvSpPr/>
+          <p:nvPr/>
+        </p:nvSpPr>
+        <p:spPr>
+          <a:xfrm>
+            <a:off x="4868276" y="1761552"/>
+            <a:ext cx="822886" cy="822886"/>
+          </a:xfrm>
+          <a:custGeom>
+            <a:avLst/>
+            <a:gdLst/>
+            <a:ahLst/>
+            <a:cxnLst/>
+            <a:rect l="l" t="t" r="r" b="b"/>
+            <a:pathLst>
+              <a:path w="16384" h="16384" extrusionOk="0">
+                <a:moveTo>
+                  <a:pt x="5198" y="16384"/>
+                </a:moveTo>
+                <a:cubicBezTo>
+                  <a:pt x="2341" y="16384"/>
+                  <a:pt x="1" y="14043"/>
+                  <a:pt x="1" y="11186"/>
+                </a:cubicBezTo>
+                <a:lnTo>
+                  <a:pt x="1" y="5198"/>
+                </a:lnTo>
+                <a:cubicBezTo>
+                  <a:pt x="1" y="2341"/>
+                  <a:pt x="2341" y="1"/>
+                  <a:pt x="5198" y="1"/>
+                </a:cubicBezTo>
+                <a:lnTo>
+                  <a:pt x="11186" y="1"/>
+                </a:lnTo>
+                <a:cubicBezTo>
+                  <a:pt x="14043" y="1"/>
+                  <a:pt x="16384" y="2341"/>
+                  <a:pt x="16384" y="5198"/>
+                </a:cubicBezTo>
+                <a:lnTo>
+                  <a:pt x="16384" y="11186"/>
+                </a:lnTo>
+                <a:cubicBezTo>
+                  <a:pt x="16384" y="14043"/>
+                  <a:pt x="14043" y="16384"/>
+                  <a:pt x="11186" y="16384"/>
+                </a:cubicBezTo>
+                <a:close/>
+              </a:path>
+            </a:pathLst>
+          </a:custGeom>
+          <a:gradFill>
+            <a:gsLst>
+              <a:gs pos="0">
+                <a:schemeClr val="accent2"/>
+              </a:gs>
+              <a:gs pos="100000">
+                <a:schemeClr val="accent3"/>
+              </a:gs>
+            </a:gsLst>
+            <a:lin ang="8100019" scaled="0"/>
+          </a:gradFill>
+          <a:ln w="9525" cap="flat" cmpd="sng">
+            <a:solidFill>
+              <a:schemeClr val="lt1"/>
+            </a:solidFill>
+            <a:prstDash val="solid"/>
+            <a:round/>
+            <a:headEnd type="none" w="sm" len="sm"/>
+            <a:tailEnd type="none" w="sm" len="sm"/>
+          </a:ln>
+        </p:spPr>
+        <p:txBody>
+          <a:bodyPr spcFirstLastPara="1" wrap="square" lIns="91425" tIns="91425" rIns="91425" bIns="91425" anchor="ctr" anchorCtr="0">
+            <a:noAutofit/>
+          </a:bodyPr>
+          <a:lstStyle/>
+          <a:p>
+            <a:pPr marL="0" marR="0" lvl="0" indent="0" algn="l" defTabSz="914400" rtl="0" eaLnBrk="1" fontAlgn="auto" latinLnBrk="0" hangingPunct="1">
+              <a:lnSpc>
+                <a:spcPct val="100000"/>
+              </a:lnSpc>
+              <a:spcBef>
+                <a:spcPts val="0"/>
+              </a:spcBef>
+              <a:spcAft>
+                <a:spcPts val="0"/>
+              </a:spcAft>
+              <a:buClr>
+                <a:srgbClr val="000000"/>
+              </a:buClr>
+              <a:buSzTx/>
+              <a:buFont typeface="Arial"/>
+              <a:buNone/>
+              <a:tabLst/>
+              <a:defRPr/>
+            </a:pPr>
+            <a:endParaRPr kumimoji="0" sz="1400" b="0" i="0" u="none" strike="noStrike" kern="0" cap="none" spc="0" normalizeH="0" baseline="0" noProof="0">
+              <a:ln>
+                <a:noFill/>
+              </a:ln>
+              <a:solidFill>
+                <a:srgbClr val="000000"/>
+              </a:solidFill>
+              <a:effectLst/>
+              <a:uLnTx/>
+              <a:uFillTx/>
+              <a:latin typeface="Arial"/>
+              <a:cs typeface="Arial"/>
+              <a:sym typeface="Arial"/>
+            </a:endParaRPr>
+          </a:p>
+        </p:txBody>
+      </p:sp>
+      <p:sp>
+        <p:nvSpPr>
+          <p:cNvPr id="1361" name="Google Shape;1361;p89"/>
+          <p:cNvSpPr/>
+          <p:nvPr/>
+        </p:nvSpPr>
+        <p:spPr>
+          <a:xfrm>
+            <a:off x="1068701" y="1761552"/>
+            <a:ext cx="822886" cy="822886"/>
+          </a:xfrm>
+          <a:custGeom>
+            <a:avLst/>
+            <a:gdLst/>
+            <a:ahLst/>
+            <a:cxnLst/>
+            <a:rect l="l" t="t" r="r" b="b"/>
+            <a:pathLst>
+              <a:path w="16384" h="16384" extrusionOk="0">
+                <a:moveTo>
+                  <a:pt x="5198" y="16384"/>
+                </a:moveTo>
+                <a:cubicBezTo>
+                  <a:pt x="2341" y="16384"/>
+                  <a:pt x="1" y="14043"/>
+                  <a:pt x="1" y="11186"/>
+                </a:cubicBezTo>
+                <a:lnTo>
+                  <a:pt x="1" y="5198"/>
+                </a:lnTo>
+                <a:cubicBezTo>
+                  <a:pt x="1" y="2341"/>
+                  <a:pt x="2341" y="1"/>
+                  <a:pt x="5198" y="1"/>
+                </a:cubicBezTo>
+                <a:lnTo>
+                  <a:pt x="11186" y="1"/>
+                </a:lnTo>
+                <a:cubicBezTo>
+                  <a:pt x="14043" y="1"/>
+                  <a:pt x="16384" y="2341"/>
+                  <a:pt x="16384" y="5198"/>
+                </a:cubicBezTo>
+                <a:lnTo>
+                  <a:pt x="16384" y="11186"/>
+                </a:lnTo>
+                <a:cubicBezTo>
+                  <a:pt x="16384" y="14043"/>
+                  <a:pt x="14043" y="16384"/>
+                  <a:pt x="11186" y="16384"/>
+                </a:cubicBezTo>
+                <a:close/>
+              </a:path>
+            </a:pathLst>
+          </a:custGeom>
+          <a:gradFill>
+            <a:gsLst>
+              <a:gs pos="0">
+                <a:schemeClr val="accent2"/>
+              </a:gs>
+              <a:gs pos="100000">
+                <a:schemeClr val="accent3"/>
+              </a:gs>
+            </a:gsLst>
+            <a:lin ang="8100019" scaled="0"/>
+          </a:gradFill>
+          <a:ln w="9525" cap="flat" cmpd="sng">
+            <a:solidFill>
+              <a:schemeClr val="lt1"/>
+            </a:solidFill>
+            <a:prstDash val="solid"/>
+            <a:round/>
+            <a:headEnd type="none" w="sm" len="sm"/>
+            <a:tailEnd type="none" w="sm" len="sm"/>
+          </a:ln>
+        </p:spPr>
+        <p:txBody>
+          <a:bodyPr spcFirstLastPara="1" wrap="square" lIns="91425" tIns="91425" rIns="91425" bIns="91425" anchor="ctr" anchorCtr="0">
+            <a:noAutofit/>
+          </a:bodyPr>
+          <a:lstStyle/>
+          <a:p>
+            <a:pPr marL="0" marR="0" lvl="0" indent="0" algn="l" defTabSz="914400" rtl="0" eaLnBrk="1" fontAlgn="auto" latinLnBrk="0" hangingPunct="1">
+              <a:lnSpc>
+                <a:spcPct val="100000"/>
+              </a:lnSpc>
+              <a:spcBef>
+                <a:spcPts val="0"/>
+              </a:spcBef>
+              <a:spcAft>
+                <a:spcPts val="0"/>
+              </a:spcAft>
+              <a:buClr>
+                <a:srgbClr val="000000"/>
+              </a:buClr>
+              <a:buSzTx/>
+              <a:buFont typeface="Arial"/>
+              <a:buNone/>
+              <a:tabLst/>
+              <a:defRPr/>
+            </a:pPr>
+            <a:endParaRPr kumimoji="0" sz="1400" b="0" i="0" u="none" strike="noStrike" kern="0" cap="none" spc="0" normalizeH="0" baseline="0" noProof="0">
+              <a:ln>
+                <a:noFill/>
+              </a:ln>
+              <a:solidFill>
+                <a:srgbClr val="000000"/>
+              </a:solidFill>
+              <a:effectLst/>
+              <a:uLnTx/>
+              <a:uFillTx/>
+              <a:latin typeface="Arial"/>
+              <a:cs typeface="Arial"/>
+              <a:sym typeface="Arial"/>
+            </a:endParaRPr>
+          </a:p>
+        </p:txBody>
+      </p:sp>
+      <p:sp>
+        <p:nvSpPr>
+          <p:cNvPr id="1362" name="Google Shape;1362;p89"/>
+          <p:cNvSpPr txBox="1">
+            <a:spLocks noGrp="1"/>
+          </p:cNvSpPr>
+          <p:nvPr>
+            <p:ph type="title" idx="4"/>
+          </p:nvPr>
+        </p:nvSpPr>
+        <p:spPr>
+          <a:xfrm>
+            <a:off x="2089762" y="3296445"/>
+            <a:ext cx="2580300" cy="434400"/>
+          </a:xfrm>
+          <a:prstGeom prst="rect">
+            <a:avLst/>
+          </a:prstGeom>
+        </p:spPr>
+        <p:txBody>
+          <a:bodyPr spcFirstLastPara="1" wrap="square" lIns="91425" tIns="91425" rIns="91425" bIns="91425" anchor="ctr" anchorCtr="0">
+            <a:noAutofit/>
+          </a:bodyPr>
+          <a:lstStyle/>
+          <a:p>
+            <a:pPr marL="0" lvl="0" indent="0" algn="l" rtl="0">
+              <a:spcBef>
+                <a:spcPts val="0"/>
+              </a:spcBef>
+              <a:spcAft>
+                <a:spcPts val="0"/>
+              </a:spcAft>
+              <a:buNone/>
+            </a:pPr>
+            <a:r>
+              <a:rPr lang="en" sz="1900" dirty="0"/>
+              <a:t>MODEL ANALYSIS</a:t>
+            </a:r>
+            <a:endParaRPr sz="1900" dirty="0"/>
+          </a:p>
+        </p:txBody>
+      </p:sp>
+      <p:sp>
+        <p:nvSpPr>
+          <p:cNvPr id="1364" name="Google Shape;1364;p89"/>
+          <p:cNvSpPr txBox="1">
+            <a:spLocks noGrp="1"/>
+          </p:cNvSpPr>
+          <p:nvPr>
+            <p:ph type="title" idx="7"/>
+          </p:nvPr>
+        </p:nvSpPr>
+        <p:spPr>
+          <a:xfrm>
+            <a:off x="1068700" y="1852888"/>
+            <a:ext cx="822900" cy="640200"/>
+          </a:xfrm>
+          <a:prstGeom prst="rect">
+            <a:avLst/>
+          </a:prstGeom>
+          <a:noFill/>
+        </p:spPr>
+        <p:txBody>
+          <a:bodyPr spcFirstLastPara="1" wrap="square" lIns="91425" tIns="91425" rIns="91425" bIns="91425" anchor="ctr" anchorCtr="0">
+            <a:noAutofit/>
+          </a:bodyPr>
+          <a:lstStyle/>
+          <a:p>
+            <a:pPr marL="0" lvl="0" indent="0" algn="ctr" rtl="0">
+              <a:spcBef>
+                <a:spcPts val="0"/>
+              </a:spcBef>
+              <a:spcAft>
+                <a:spcPts val="0"/>
+              </a:spcAft>
+              <a:buNone/>
+            </a:pPr>
+            <a:r>
+              <a:rPr lang="en"/>
+              <a:t>01</a:t>
+            </a:r>
+            <a:endParaRPr/>
+          </a:p>
+        </p:txBody>
+      </p:sp>
+      <p:sp>
+        <p:nvSpPr>
+          <p:cNvPr id="1365" name="Google Shape;1365;p89"/>
+          <p:cNvSpPr txBox="1">
+            <a:spLocks noGrp="1"/>
+          </p:cNvSpPr>
+          <p:nvPr>
+            <p:ph type="title"/>
+          </p:nvPr>
+        </p:nvSpPr>
+        <p:spPr>
+          <a:xfrm>
+            <a:off x="1991675" y="1899775"/>
+            <a:ext cx="2580300" cy="434400"/>
+          </a:xfrm>
+          <a:prstGeom prst="rect">
+            <a:avLst/>
+          </a:prstGeom>
+        </p:spPr>
+        <p:txBody>
+          <a:bodyPr spcFirstLastPara="1" wrap="square" lIns="91425" tIns="91425" rIns="91425" bIns="91425" anchor="ctr" anchorCtr="0">
+            <a:noAutofit/>
+          </a:bodyPr>
+          <a:lstStyle/>
+          <a:p>
+            <a:pPr marL="0" lvl="0" indent="0" algn="l" rtl="0">
+              <a:spcBef>
+                <a:spcPts val="0"/>
+              </a:spcBef>
+              <a:spcAft>
+                <a:spcPts val="0"/>
+              </a:spcAft>
+              <a:buNone/>
+            </a:pPr>
+            <a:r>
+              <a:rPr lang="en" sz="1900" dirty="0"/>
+              <a:t>INTRODUCTION</a:t>
+            </a:r>
+            <a:endParaRPr sz="1900" dirty="0"/>
+          </a:p>
+        </p:txBody>
+      </p:sp>
+      <p:sp>
+        <p:nvSpPr>
+          <p:cNvPr id="1366" name="Google Shape;1366;p89"/>
+          <p:cNvSpPr txBox="1">
+            <a:spLocks noGrp="1"/>
+          </p:cNvSpPr>
+          <p:nvPr>
+            <p:ph type="title" idx="2"/>
+          </p:nvPr>
+        </p:nvSpPr>
+        <p:spPr>
+          <a:xfrm>
+            <a:off x="5786525" y="1899775"/>
+            <a:ext cx="2580300" cy="434400"/>
+          </a:xfrm>
+          <a:prstGeom prst="rect">
+            <a:avLst/>
+          </a:prstGeom>
+        </p:spPr>
+        <p:txBody>
+          <a:bodyPr spcFirstLastPara="1" wrap="square" lIns="91425" tIns="91425" rIns="91425" bIns="91425" anchor="ctr" anchorCtr="0">
+            <a:noAutofit/>
+          </a:bodyPr>
+          <a:lstStyle/>
+          <a:p>
+            <a:pPr marL="0" lvl="0" indent="0" algn="l" rtl="0">
+              <a:spcBef>
+                <a:spcPts val="0"/>
+              </a:spcBef>
+              <a:spcAft>
+                <a:spcPts val="0"/>
+              </a:spcAft>
+              <a:buNone/>
+            </a:pPr>
+            <a:r>
+              <a:rPr lang="en" sz="1900" dirty="0"/>
+              <a:t>APPLICATION</a:t>
+            </a:r>
+            <a:endParaRPr sz="1900" dirty="0"/>
+          </a:p>
+        </p:txBody>
+      </p:sp>
+      <p:sp>
+        <p:nvSpPr>
+          <p:cNvPr id="1368" name="Google Shape;1368;p89"/>
+          <p:cNvSpPr txBox="1">
+            <a:spLocks noGrp="1"/>
+          </p:cNvSpPr>
+          <p:nvPr>
+            <p:ph type="title" idx="5"/>
+          </p:nvPr>
+        </p:nvSpPr>
+        <p:spPr>
+          <a:xfrm>
+            <a:off x="5786525" y="2879926"/>
+            <a:ext cx="3357476" cy="1288548"/>
+          </a:xfrm>
+          <a:prstGeom prst="rect">
+            <a:avLst/>
+          </a:prstGeom>
+        </p:spPr>
+        <p:txBody>
+          <a:bodyPr spcFirstLastPara="1" wrap="square" lIns="91425" tIns="91425" rIns="91425" bIns="91425" anchor="ctr" anchorCtr="0">
+            <a:noAutofit/>
+          </a:bodyPr>
+          <a:lstStyle/>
+          <a:p>
+            <a:pPr marL="0" lvl="0" indent="0" algn="l" rtl="0">
+              <a:spcBef>
+                <a:spcPts val="0"/>
+              </a:spcBef>
+              <a:spcAft>
+                <a:spcPts val="0"/>
+              </a:spcAft>
+              <a:buNone/>
+            </a:pPr>
+            <a:r>
+              <a:rPr lang="it-IT" sz="1900" dirty="0"/>
+              <a:t>POWER CONSUMPTION ANALYSIS</a:t>
+            </a:r>
+            <a:endParaRPr sz="1900" dirty="0"/>
+          </a:p>
+        </p:txBody>
+      </p:sp>
+      <p:sp>
+        <p:nvSpPr>
+          <p:cNvPr id="1370" name="Google Shape;1370;p89"/>
+          <p:cNvSpPr txBox="1">
+            <a:spLocks noGrp="1"/>
+          </p:cNvSpPr>
+          <p:nvPr>
+            <p:ph type="title" idx="8"/>
+          </p:nvPr>
+        </p:nvSpPr>
+        <p:spPr>
+          <a:xfrm>
+            <a:off x="4868250" y="1858800"/>
+            <a:ext cx="822900" cy="640200"/>
+          </a:xfrm>
+          <a:prstGeom prst="rect">
+            <a:avLst/>
+          </a:prstGeom>
+          <a:noFill/>
+        </p:spPr>
+        <p:txBody>
+          <a:bodyPr spcFirstLastPara="1" wrap="square" lIns="91425" tIns="91425" rIns="91425" bIns="91425" anchor="ctr" anchorCtr="0">
+            <a:noAutofit/>
+          </a:bodyPr>
+          <a:lstStyle/>
+          <a:p>
+            <a:pPr marL="0" lvl="0" indent="0" algn="ctr" rtl="0">
+              <a:spcBef>
+                <a:spcPts val="0"/>
+              </a:spcBef>
+              <a:spcAft>
+                <a:spcPts val="0"/>
+              </a:spcAft>
+              <a:buNone/>
+            </a:pPr>
+            <a:r>
+              <a:rPr lang="en"/>
+              <a:t>02</a:t>
+            </a:r>
+            <a:endParaRPr/>
+          </a:p>
+        </p:txBody>
+      </p:sp>
+      <p:sp>
+        <p:nvSpPr>
+          <p:cNvPr id="1371" name="Google Shape;1371;p89"/>
+          <p:cNvSpPr txBox="1">
+            <a:spLocks noGrp="1"/>
+          </p:cNvSpPr>
+          <p:nvPr>
+            <p:ph type="title" idx="9"/>
+          </p:nvPr>
+        </p:nvSpPr>
+        <p:spPr>
+          <a:xfrm>
+            <a:off x="1068700" y="3193550"/>
+            <a:ext cx="822900" cy="640200"/>
+          </a:xfrm>
+          <a:prstGeom prst="rect">
+            <a:avLst/>
+          </a:prstGeom>
+          <a:noFill/>
+        </p:spPr>
+        <p:txBody>
+          <a:bodyPr spcFirstLastPara="1" wrap="square" lIns="91425" tIns="91425" rIns="91425" bIns="91425" anchor="ctr" anchorCtr="0">
+            <a:noAutofit/>
+          </a:bodyPr>
+          <a:lstStyle/>
+          <a:p>
+            <a:pPr marL="0" lvl="0" indent="0" algn="ctr" rtl="0">
+              <a:spcBef>
+                <a:spcPts val="0"/>
+              </a:spcBef>
+              <a:spcAft>
+                <a:spcPts val="0"/>
+              </a:spcAft>
+              <a:buNone/>
+            </a:pPr>
+            <a:r>
+              <a:rPr lang="en"/>
+              <a:t>03</a:t>
+            </a:r>
+            <a:endParaRPr/>
+          </a:p>
+        </p:txBody>
+      </p:sp>
+      <p:sp>
+        <p:nvSpPr>
+          <p:cNvPr id="1372" name="Google Shape;1372;p89"/>
+          <p:cNvSpPr txBox="1">
+            <a:spLocks noGrp="1"/>
+          </p:cNvSpPr>
+          <p:nvPr>
+            <p:ph type="title" idx="13"/>
+          </p:nvPr>
+        </p:nvSpPr>
+        <p:spPr>
+          <a:xfrm>
+            <a:off x="4868250" y="3198175"/>
+            <a:ext cx="822900" cy="640200"/>
+          </a:xfrm>
+          <a:prstGeom prst="rect">
+            <a:avLst/>
+          </a:prstGeom>
+          <a:noFill/>
+        </p:spPr>
+        <p:txBody>
+          <a:bodyPr spcFirstLastPara="1" wrap="square" lIns="91425" tIns="91425" rIns="91425" bIns="91425" anchor="ctr" anchorCtr="0">
+            <a:noAutofit/>
+          </a:bodyPr>
+          <a:lstStyle/>
+          <a:p>
+            <a:pPr marL="0" lvl="0" indent="0" algn="ctr" rtl="0">
+              <a:spcBef>
+                <a:spcPts val="0"/>
+              </a:spcBef>
+              <a:spcAft>
+                <a:spcPts val="0"/>
+              </a:spcAft>
+              <a:buNone/>
+            </a:pPr>
+            <a:r>
+              <a:rPr lang="en"/>
+              <a:t>04</a:t>
+            </a:r>
+            <a:endParaRPr/>
+          </a:p>
+        </p:txBody>
+      </p:sp>
+      <p:sp>
+        <p:nvSpPr>
+          <p:cNvPr id="1373" name="Google Shape;1373;p89"/>
+          <p:cNvSpPr txBox="1">
+            <a:spLocks noGrp="1"/>
+          </p:cNvSpPr>
+          <p:nvPr>
+            <p:ph type="title" idx="15"/>
+          </p:nvPr>
+        </p:nvSpPr>
+        <p:spPr>
+          <a:xfrm>
+            <a:off x="713225" y="657995"/>
+            <a:ext cx="7717500" cy="363000"/>
+          </a:xfrm>
+          <a:prstGeom prst="rect">
+            <a:avLst/>
+          </a:prstGeom>
+        </p:spPr>
+        <p:txBody>
+          <a:bodyPr spcFirstLastPara="1" wrap="square" lIns="91425" tIns="91425" rIns="91425" bIns="91425" anchor="ctr" anchorCtr="0">
+            <a:noAutofit/>
+          </a:bodyPr>
+          <a:lstStyle/>
+          <a:p>
+            <a:pPr marL="0" lvl="0" indent="0" algn="ctr" rtl="0">
+              <a:spcBef>
+                <a:spcPts val="0"/>
+              </a:spcBef>
+              <a:spcAft>
+                <a:spcPts val="0"/>
+              </a:spcAft>
+              <a:buNone/>
+            </a:pPr>
+            <a:r>
+              <a:rPr lang="en"/>
+              <a:t>TABLE OF CONTENTS</a:t>
+            </a:r>
+            <a:endParaRPr/>
+          </a:p>
+        </p:txBody>
+      </p:sp>
+      <p:grpSp>
+        <p:nvGrpSpPr>
+          <p:cNvPr id="1375" name="Google Shape;1375;p89"/>
+          <p:cNvGrpSpPr/>
+          <p:nvPr/>
+        </p:nvGrpSpPr>
+        <p:grpSpPr>
+          <a:xfrm rot="1285550">
+            <a:off x="7808042" y="678921"/>
+            <a:ext cx="822913" cy="818353"/>
+            <a:chOff x="5088175" y="2529243"/>
+            <a:chExt cx="822905" cy="818345"/>
+          </a:xfrm>
+        </p:grpSpPr>
+        <p:sp>
+          <p:nvSpPr>
+            <p:cNvPr id="1376" name="Google Shape;1376;p89"/>
+            <p:cNvSpPr/>
+            <p:nvPr/>
+          </p:nvSpPr>
+          <p:spPr>
+            <a:xfrm>
+              <a:off x="5092588" y="2529243"/>
+              <a:ext cx="818492" cy="818345"/>
+            </a:xfrm>
+            <a:custGeom>
+              <a:avLst/>
+              <a:gdLst/>
+              <a:ahLst/>
+              <a:cxnLst/>
+              <a:rect l="l" t="t" r="r" b="b"/>
+              <a:pathLst>
+                <a:path w="5564" h="5563" fill="none" extrusionOk="0">
+                  <a:moveTo>
+                    <a:pt x="5563" y="2766"/>
+                  </a:moveTo>
+                  <a:cubicBezTo>
+                    <a:pt x="5563" y="4317"/>
+                    <a:pt x="4317" y="5563"/>
+                    <a:pt x="2767" y="5563"/>
+                  </a:cubicBezTo>
+                  <a:cubicBezTo>
+                    <a:pt x="1217" y="5563"/>
+                    <a:pt x="1" y="4317"/>
+                    <a:pt x="1" y="2766"/>
+                  </a:cubicBezTo>
+                  <a:cubicBezTo>
+                    <a:pt x="1" y="1247"/>
+                    <a:pt x="1217" y="0"/>
+                    <a:pt x="2767" y="0"/>
+                  </a:cubicBezTo>
+                  <a:cubicBezTo>
+                    <a:pt x="4317" y="0"/>
+                    <a:pt x="5563" y="1247"/>
+                    <a:pt x="5563" y="2766"/>
+                  </a:cubicBezTo>
+                  <a:close/>
+                </a:path>
+              </a:pathLst>
+            </a:custGeom>
+            <a:noFill/>
+            <a:ln w="9525" cap="flat" cmpd="sng">
+              <a:solidFill>
+                <a:schemeClr val="accent2"/>
+              </a:solidFill>
+              <a:prstDash val="solid"/>
+              <a:miter lim="30395"/>
+              <a:headEnd type="none" w="sm" len="sm"/>
+              <a:tailEnd type="none" w="sm" len="sm"/>
+            </a:ln>
+          </p:spPr>
+          <p:txBody>
+            <a:bodyPr spcFirstLastPara="1" wrap="square" lIns="91425" tIns="91425" rIns="91425" bIns="91425" anchor="ctr" anchorCtr="0">
+              <a:noAutofit/>
+            </a:bodyPr>
+            <a:lstStyle/>
+            <a:p>
+              <a:pPr marL="0" marR="0" lvl="0" indent="0" algn="l" defTabSz="914400" rtl="0" eaLnBrk="1" fontAlgn="auto" latinLnBrk="0" hangingPunct="1">
+                <a:lnSpc>
+                  <a:spcPct val="100000"/>
+                </a:lnSpc>
+                <a:spcBef>
+                  <a:spcPts val="0"/>
+                </a:spcBef>
+                <a:spcAft>
+                  <a:spcPts val="0"/>
+                </a:spcAft>
+                <a:buClr>
+                  <a:srgbClr val="000000"/>
+                </a:buClr>
+                <a:buSzTx/>
+                <a:buFont typeface="Arial"/>
+                <a:buNone/>
+                <a:tabLst/>
+                <a:defRPr/>
+              </a:pPr>
+              <a:endParaRPr kumimoji="0" sz="1400" b="0" i="0" u="none" strike="noStrike" kern="0" cap="none" spc="0" normalizeH="0" baseline="0" noProof="0">
+                <a:ln>
+                  <a:noFill/>
+                </a:ln>
+                <a:solidFill>
+                  <a:srgbClr val="000000"/>
+                </a:solidFill>
+                <a:effectLst/>
+                <a:uLnTx/>
+                <a:uFillTx/>
+                <a:latin typeface="Arial"/>
+                <a:cs typeface="Arial"/>
+                <a:sym typeface="Arial"/>
+              </a:endParaRPr>
+            </a:p>
+          </p:txBody>
+        </p:sp>
+        <p:sp>
+          <p:nvSpPr>
+            <p:cNvPr id="1377" name="Google Shape;1377;p89"/>
+            <p:cNvSpPr/>
+            <p:nvPr/>
+          </p:nvSpPr>
+          <p:spPr>
+            <a:xfrm>
+              <a:off x="5499478" y="2529243"/>
+              <a:ext cx="147" cy="818345"/>
+            </a:xfrm>
+            <a:custGeom>
+              <a:avLst/>
+              <a:gdLst/>
+              <a:ahLst/>
+              <a:cxnLst/>
+              <a:rect l="l" t="t" r="r" b="b"/>
+              <a:pathLst>
+                <a:path w="1" h="5563" fill="none" extrusionOk="0">
+                  <a:moveTo>
+                    <a:pt x="1" y="0"/>
+                  </a:moveTo>
+                  <a:lnTo>
+                    <a:pt x="1" y="5563"/>
+                  </a:lnTo>
+                </a:path>
+              </a:pathLst>
+            </a:custGeom>
+            <a:noFill/>
+            <a:ln w="9525" cap="flat" cmpd="sng">
+              <a:solidFill>
+                <a:schemeClr val="accent2"/>
+              </a:solidFill>
+              <a:prstDash val="solid"/>
+              <a:miter lim="30395"/>
+              <a:headEnd type="none" w="sm" len="sm"/>
+              <a:tailEnd type="none" w="sm" len="sm"/>
+            </a:ln>
+          </p:spPr>
+          <p:txBody>
+            <a:bodyPr spcFirstLastPara="1" wrap="square" lIns="91425" tIns="91425" rIns="91425" bIns="91425" anchor="ctr" anchorCtr="0">
+              <a:noAutofit/>
+            </a:bodyPr>
+            <a:lstStyle/>
+            <a:p>
+              <a:pPr marL="0" marR="0" lvl="0" indent="0" algn="l" defTabSz="914400" rtl="0" eaLnBrk="1" fontAlgn="auto" latinLnBrk="0" hangingPunct="1">
+                <a:lnSpc>
+                  <a:spcPct val="100000"/>
+                </a:lnSpc>
+                <a:spcBef>
+                  <a:spcPts val="0"/>
+                </a:spcBef>
+                <a:spcAft>
+                  <a:spcPts val="0"/>
+                </a:spcAft>
+                <a:buClr>
+                  <a:srgbClr val="000000"/>
+                </a:buClr>
+                <a:buSzTx/>
+                <a:buFont typeface="Arial"/>
+                <a:buNone/>
+                <a:tabLst/>
+                <a:defRPr/>
+              </a:pPr>
+              <a:endParaRPr kumimoji="0" sz="1400" b="0" i="0" u="none" strike="noStrike" kern="0" cap="none" spc="0" normalizeH="0" baseline="0" noProof="0">
+                <a:ln>
+                  <a:noFill/>
+                </a:ln>
+                <a:solidFill>
+                  <a:srgbClr val="000000"/>
+                </a:solidFill>
+                <a:effectLst/>
+                <a:uLnTx/>
+                <a:uFillTx/>
+                <a:latin typeface="Arial"/>
+                <a:cs typeface="Arial"/>
+                <a:sym typeface="Arial"/>
+              </a:endParaRPr>
+            </a:p>
+          </p:txBody>
+        </p:sp>
+        <p:sp>
+          <p:nvSpPr>
+            <p:cNvPr id="1378" name="Google Shape;1378;p89"/>
+            <p:cNvSpPr/>
+            <p:nvPr/>
+          </p:nvSpPr>
+          <p:spPr>
+            <a:xfrm>
+              <a:off x="5307213" y="2533656"/>
+              <a:ext cx="134307" cy="809519"/>
+            </a:xfrm>
+            <a:custGeom>
+              <a:avLst/>
+              <a:gdLst/>
+              <a:ahLst/>
+              <a:cxnLst/>
+              <a:rect l="l" t="t" r="r" b="b"/>
+              <a:pathLst>
+                <a:path w="913" h="5503" fill="none" extrusionOk="0">
+                  <a:moveTo>
+                    <a:pt x="913" y="5502"/>
+                  </a:moveTo>
+                  <a:cubicBezTo>
+                    <a:pt x="913" y="5502"/>
+                    <a:pt x="1" y="4712"/>
+                    <a:pt x="1" y="2736"/>
+                  </a:cubicBezTo>
+                  <a:cubicBezTo>
+                    <a:pt x="1" y="791"/>
+                    <a:pt x="913" y="1"/>
+                    <a:pt x="913" y="1"/>
+                  </a:cubicBezTo>
+                </a:path>
+              </a:pathLst>
+            </a:custGeom>
+            <a:noFill/>
+            <a:ln w="9525" cap="flat" cmpd="sng">
+              <a:solidFill>
+                <a:schemeClr val="accent2"/>
+              </a:solidFill>
+              <a:prstDash val="solid"/>
+              <a:miter lim="30395"/>
+              <a:headEnd type="none" w="sm" len="sm"/>
+              <a:tailEnd type="none" w="sm" len="sm"/>
+            </a:ln>
+          </p:spPr>
+          <p:txBody>
+            <a:bodyPr spcFirstLastPara="1" wrap="square" lIns="91425" tIns="91425" rIns="91425" bIns="91425" anchor="ctr" anchorCtr="0">
+              <a:noAutofit/>
+            </a:bodyPr>
+            <a:lstStyle/>
+            <a:p>
+              <a:pPr marL="0" marR="0" lvl="0" indent="0" algn="l" defTabSz="914400" rtl="0" eaLnBrk="1" fontAlgn="auto" latinLnBrk="0" hangingPunct="1">
+                <a:lnSpc>
+                  <a:spcPct val="100000"/>
+                </a:lnSpc>
+                <a:spcBef>
+                  <a:spcPts val="0"/>
+                </a:spcBef>
+                <a:spcAft>
+                  <a:spcPts val="0"/>
+                </a:spcAft>
+                <a:buClr>
+                  <a:srgbClr val="000000"/>
+                </a:buClr>
+                <a:buSzTx/>
+                <a:buFont typeface="Arial"/>
+                <a:buNone/>
+                <a:tabLst/>
+                <a:defRPr/>
+              </a:pPr>
+              <a:endParaRPr kumimoji="0" sz="1400" b="0" i="0" u="none" strike="noStrike" kern="0" cap="none" spc="0" normalizeH="0" baseline="0" noProof="0">
+                <a:ln>
+                  <a:noFill/>
+                </a:ln>
+                <a:solidFill>
+                  <a:srgbClr val="000000"/>
+                </a:solidFill>
+                <a:effectLst/>
+                <a:uLnTx/>
+                <a:uFillTx/>
+                <a:latin typeface="Arial"/>
+                <a:cs typeface="Arial"/>
+                <a:sym typeface="Arial"/>
+              </a:endParaRPr>
+            </a:p>
+          </p:txBody>
+        </p:sp>
+        <p:sp>
+          <p:nvSpPr>
+            <p:cNvPr id="1379" name="Google Shape;1379;p89"/>
+            <p:cNvSpPr/>
+            <p:nvPr/>
+          </p:nvSpPr>
+          <p:spPr>
+            <a:xfrm>
+              <a:off x="5562144" y="2533656"/>
+              <a:ext cx="134307" cy="809519"/>
+            </a:xfrm>
+            <a:custGeom>
+              <a:avLst/>
+              <a:gdLst/>
+              <a:ahLst/>
+              <a:cxnLst/>
+              <a:rect l="l" t="t" r="r" b="b"/>
+              <a:pathLst>
+                <a:path w="913" h="5503" fill="none" extrusionOk="0">
+                  <a:moveTo>
+                    <a:pt x="0" y="5502"/>
+                  </a:moveTo>
+                  <a:cubicBezTo>
+                    <a:pt x="0" y="5502"/>
+                    <a:pt x="912" y="4712"/>
+                    <a:pt x="912" y="2736"/>
+                  </a:cubicBezTo>
+                  <a:cubicBezTo>
+                    <a:pt x="912" y="791"/>
+                    <a:pt x="0" y="1"/>
+                    <a:pt x="0" y="1"/>
+                  </a:cubicBezTo>
+                </a:path>
+              </a:pathLst>
+            </a:custGeom>
+            <a:noFill/>
+            <a:ln w="9525" cap="flat" cmpd="sng">
+              <a:solidFill>
+                <a:schemeClr val="accent2"/>
+              </a:solidFill>
+              <a:prstDash val="solid"/>
+              <a:miter lim="30395"/>
+              <a:headEnd type="none" w="sm" len="sm"/>
+              <a:tailEnd type="none" w="sm" len="sm"/>
+            </a:ln>
+          </p:spPr>
+          <p:txBody>
+            <a:bodyPr spcFirstLastPara="1" wrap="square" lIns="91425" tIns="91425" rIns="91425" bIns="91425" anchor="ctr" anchorCtr="0">
+              <a:noAutofit/>
+            </a:bodyPr>
+            <a:lstStyle/>
+            <a:p>
+              <a:pPr marL="0" marR="0" lvl="0" indent="0" algn="l" defTabSz="914400" rtl="0" eaLnBrk="1" fontAlgn="auto" latinLnBrk="0" hangingPunct="1">
+                <a:lnSpc>
+                  <a:spcPct val="100000"/>
+                </a:lnSpc>
+                <a:spcBef>
+                  <a:spcPts val="0"/>
+                </a:spcBef>
+                <a:spcAft>
+                  <a:spcPts val="0"/>
+                </a:spcAft>
+                <a:buClr>
+                  <a:srgbClr val="000000"/>
+                </a:buClr>
+                <a:buSzTx/>
+                <a:buFont typeface="Arial"/>
+                <a:buNone/>
+                <a:tabLst/>
+                <a:defRPr/>
+              </a:pPr>
+              <a:endParaRPr kumimoji="0" sz="1400" b="0" i="0" u="none" strike="noStrike" kern="0" cap="none" spc="0" normalizeH="0" baseline="0" noProof="0">
+                <a:ln>
+                  <a:noFill/>
+                </a:ln>
+                <a:solidFill>
+                  <a:srgbClr val="000000"/>
+                </a:solidFill>
+                <a:effectLst/>
+                <a:uLnTx/>
+                <a:uFillTx/>
+                <a:latin typeface="Arial"/>
+                <a:cs typeface="Arial"/>
+                <a:sym typeface="Arial"/>
+              </a:endParaRPr>
+            </a:p>
+          </p:txBody>
+        </p:sp>
+        <p:sp>
+          <p:nvSpPr>
+            <p:cNvPr id="1380" name="Google Shape;1380;p89"/>
+            <p:cNvSpPr/>
+            <p:nvPr/>
+          </p:nvSpPr>
+          <p:spPr>
+            <a:xfrm>
+              <a:off x="5088175" y="2936132"/>
+              <a:ext cx="822905" cy="147"/>
+            </a:xfrm>
+            <a:custGeom>
+              <a:avLst/>
+              <a:gdLst/>
+              <a:ahLst/>
+              <a:cxnLst/>
+              <a:rect l="l" t="t" r="r" b="b"/>
+              <a:pathLst>
+                <a:path w="5594" h="1" fill="none" extrusionOk="0">
+                  <a:moveTo>
+                    <a:pt x="0" y="0"/>
+                  </a:moveTo>
+                  <a:lnTo>
+                    <a:pt x="5593" y="0"/>
+                  </a:lnTo>
+                </a:path>
+              </a:pathLst>
+            </a:custGeom>
+            <a:noFill/>
+            <a:ln w="9525" cap="flat" cmpd="sng">
+              <a:solidFill>
+                <a:schemeClr val="accent2"/>
+              </a:solidFill>
+              <a:prstDash val="solid"/>
+              <a:miter lim="30395"/>
+              <a:headEnd type="none" w="sm" len="sm"/>
+              <a:tailEnd type="none" w="sm" len="sm"/>
+            </a:ln>
+          </p:spPr>
+          <p:txBody>
+            <a:bodyPr spcFirstLastPara="1" wrap="square" lIns="91425" tIns="91425" rIns="91425" bIns="91425" anchor="ctr" anchorCtr="0">
+              <a:noAutofit/>
+            </a:bodyPr>
+            <a:lstStyle/>
+            <a:p>
+              <a:pPr marL="0" marR="0" lvl="0" indent="0" algn="l" defTabSz="914400" rtl="0" eaLnBrk="1" fontAlgn="auto" latinLnBrk="0" hangingPunct="1">
+                <a:lnSpc>
+                  <a:spcPct val="100000"/>
+                </a:lnSpc>
+                <a:spcBef>
+                  <a:spcPts val="0"/>
+                </a:spcBef>
+                <a:spcAft>
+                  <a:spcPts val="0"/>
+                </a:spcAft>
+                <a:buClr>
+                  <a:srgbClr val="000000"/>
+                </a:buClr>
+                <a:buSzTx/>
+                <a:buFont typeface="Arial"/>
+                <a:buNone/>
+                <a:tabLst/>
+                <a:defRPr/>
+              </a:pPr>
+              <a:endParaRPr kumimoji="0" sz="1400" b="0" i="0" u="none" strike="noStrike" kern="0" cap="none" spc="0" normalizeH="0" baseline="0" noProof="0">
+                <a:ln>
+                  <a:noFill/>
+                </a:ln>
+                <a:solidFill>
+                  <a:srgbClr val="000000"/>
+                </a:solidFill>
+                <a:effectLst/>
+                <a:uLnTx/>
+                <a:uFillTx/>
+                <a:latin typeface="Arial"/>
+                <a:cs typeface="Arial"/>
+                <a:sym typeface="Arial"/>
+              </a:endParaRPr>
+            </a:p>
+          </p:txBody>
+        </p:sp>
+        <p:sp>
+          <p:nvSpPr>
+            <p:cNvPr id="1381" name="Google Shape;1381;p89"/>
+            <p:cNvSpPr/>
+            <p:nvPr/>
+          </p:nvSpPr>
+          <p:spPr>
+            <a:xfrm>
+              <a:off x="5191001" y="3128397"/>
+              <a:ext cx="626079" cy="67227"/>
+            </a:xfrm>
+            <a:custGeom>
+              <a:avLst/>
+              <a:gdLst/>
+              <a:ahLst/>
+              <a:cxnLst/>
+              <a:rect l="l" t="t" r="r" b="b"/>
+              <a:pathLst>
+                <a:path w="4256" h="457" fill="none" extrusionOk="0">
+                  <a:moveTo>
+                    <a:pt x="4256" y="456"/>
+                  </a:moveTo>
+                  <a:cubicBezTo>
+                    <a:pt x="3830" y="244"/>
+                    <a:pt x="3101" y="0"/>
+                    <a:pt x="2098" y="0"/>
+                  </a:cubicBezTo>
+                  <a:cubicBezTo>
+                    <a:pt x="1125" y="0"/>
+                    <a:pt x="426" y="213"/>
+                    <a:pt x="1" y="456"/>
+                  </a:cubicBezTo>
+                </a:path>
+              </a:pathLst>
+            </a:custGeom>
+            <a:noFill/>
+            <a:ln w="9525" cap="flat" cmpd="sng">
+              <a:solidFill>
+                <a:schemeClr val="accent2"/>
+              </a:solidFill>
+              <a:prstDash val="solid"/>
+              <a:miter lim="30395"/>
+              <a:headEnd type="none" w="sm" len="sm"/>
+              <a:tailEnd type="none" w="sm" len="sm"/>
+            </a:ln>
+          </p:spPr>
+          <p:txBody>
+            <a:bodyPr spcFirstLastPara="1" wrap="square" lIns="91425" tIns="91425" rIns="91425" bIns="91425" anchor="ctr" anchorCtr="0">
+              <a:noAutofit/>
+            </a:bodyPr>
+            <a:lstStyle/>
+            <a:p>
+              <a:pPr marL="0" marR="0" lvl="0" indent="0" algn="l" defTabSz="914400" rtl="0" eaLnBrk="1" fontAlgn="auto" latinLnBrk="0" hangingPunct="1">
+                <a:lnSpc>
+                  <a:spcPct val="100000"/>
+                </a:lnSpc>
+                <a:spcBef>
+                  <a:spcPts val="0"/>
+                </a:spcBef>
+                <a:spcAft>
+                  <a:spcPts val="0"/>
+                </a:spcAft>
+                <a:buClr>
+                  <a:srgbClr val="000000"/>
+                </a:buClr>
+                <a:buSzTx/>
+                <a:buFont typeface="Arial"/>
+                <a:buNone/>
+                <a:tabLst/>
+                <a:defRPr/>
+              </a:pPr>
+              <a:endParaRPr kumimoji="0" sz="1400" b="0" i="0" u="none" strike="noStrike" kern="0" cap="none" spc="0" normalizeH="0" baseline="0" noProof="0">
+                <a:ln>
+                  <a:noFill/>
+                </a:ln>
+                <a:solidFill>
+                  <a:srgbClr val="000000"/>
+                </a:solidFill>
+                <a:effectLst/>
+                <a:uLnTx/>
+                <a:uFillTx/>
+                <a:latin typeface="Arial"/>
+                <a:cs typeface="Arial"/>
+                <a:sym typeface="Arial"/>
+              </a:endParaRPr>
+            </a:p>
+          </p:txBody>
+        </p:sp>
+        <p:sp>
+          <p:nvSpPr>
+            <p:cNvPr id="1382" name="Google Shape;1382;p89"/>
+            <p:cNvSpPr/>
+            <p:nvPr/>
+          </p:nvSpPr>
+          <p:spPr>
+            <a:xfrm>
+              <a:off x="5191001" y="2694735"/>
+              <a:ext cx="626079" cy="71640"/>
+            </a:xfrm>
+            <a:custGeom>
+              <a:avLst/>
+              <a:gdLst/>
+              <a:ahLst/>
+              <a:cxnLst/>
+              <a:rect l="l" t="t" r="r" b="b"/>
+              <a:pathLst>
+                <a:path w="4256" h="487" fill="none" extrusionOk="0">
+                  <a:moveTo>
+                    <a:pt x="1" y="0"/>
+                  </a:moveTo>
+                  <a:cubicBezTo>
+                    <a:pt x="426" y="243"/>
+                    <a:pt x="1125" y="486"/>
+                    <a:pt x="2159" y="486"/>
+                  </a:cubicBezTo>
+                  <a:cubicBezTo>
+                    <a:pt x="3131" y="486"/>
+                    <a:pt x="3830" y="243"/>
+                    <a:pt x="4256" y="30"/>
+                  </a:cubicBezTo>
+                </a:path>
+              </a:pathLst>
+            </a:custGeom>
+            <a:noFill/>
+            <a:ln w="9525" cap="flat" cmpd="sng">
+              <a:solidFill>
+                <a:schemeClr val="accent2"/>
+              </a:solidFill>
+              <a:prstDash val="solid"/>
+              <a:miter lim="30395"/>
+              <a:headEnd type="none" w="sm" len="sm"/>
+              <a:tailEnd type="none" w="sm" len="sm"/>
+            </a:ln>
+          </p:spPr>
+          <p:txBody>
+            <a:bodyPr spcFirstLastPara="1" wrap="square" lIns="91425" tIns="91425" rIns="91425" bIns="91425" anchor="ctr" anchorCtr="0">
+              <a:noAutofit/>
+            </a:bodyPr>
+            <a:lstStyle/>
+            <a:p>
+              <a:pPr marL="0" marR="0" lvl="0" indent="0" algn="l" defTabSz="914400" rtl="0" eaLnBrk="1" fontAlgn="auto" latinLnBrk="0" hangingPunct="1">
+                <a:lnSpc>
+                  <a:spcPct val="100000"/>
+                </a:lnSpc>
+                <a:spcBef>
+                  <a:spcPts val="0"/>
+                </a:spcBef>
+                <a:spcAft>
+                  <a:spcPts val="0"/>
+                </a:spcAft>
+                <a:buClr>
+                  <a:srgbClr val="000000"/>
+                </a:buClr>
+                <a:buSzTx/>
+                <a:buFont typeface="Arial"/>
+                <a:buNone/>
+                <a:tabLst/>
+                <a:defRPr/>
+              </a:pPr>
+              <a:endParaRPr kumimoji="0" sz="1400" b="0" i="0" u="none" strike="noStrike" kern="0" cap="none" spc="0" normalizeH="0" baseline="0" noProof="0">
+                <a:ln>
+                  <a:noFill/>
+                </a:ln>
+                <a:solidFill>
+                  <a:srgbClr val="000000"/>
+                </a:solidFill>
+                <a:effectLst/>
+                <a:uLnTx/>
+                <a:uFillTx/>
+                <a:latin typeface="Arial"/>
+                <a:cs typeface="Arial"/>
+                <a:sym typeface="Arial"/>
+              </a:endParaRPr>
+            </a:p>
+          </p:txBody>
+        </p:sp>
+      </p:grpSp>
+    </p:spTree>
+  </p:cSld>
+  <p:clrMapOvr>
+    <a:masterClrMapping/>
+  </p:clrMapOvr>
+</p:sld>
+</file>
+
+<file path=ppt/slides/slide20.xml><?xml version="1.0" encoding="utf-8"?>
 <p:sld xmlns:a="http://schemas.openxmlformats.org/drawingml/2006/main" xmlns:r="http://schemas.openxmlformats.org/officeDocument/2006/relationships" xmlns:p="http://schemas.openxmlformats.org/presentationml/2006/main">
   <p:cSld>
     <p:spTree>
@@ -27697,1514 +30070,7 @@
 </p:sld>
 </file>
 
-<file path=ppt/slides/slide2.xml><?xml version="1.0" encoding="utf-8"?>
-<p:sld xmlns:a="http://schemas.openxmlformats.org/drawingml/2006/main" xmlns:r="http://schemas.openxmlformats.org/officeDocument/2006/relationships" xmlns:p="http://schemas.openxmlformats.org/presentationml/2006/main">
-  <p:cSld>
-    <p:spTree>
-      <p:nvGrpSpPr>
-        <p:cNvPr id="1" name="Shape 1357"/>
-        <p:cNvGrpSpPr/>
-        <p:nvPr/>
-      </p:nvGrpSpPr>
-      <p:grpSpPr>
-        <a:xfrm>
-          <a:off x="0" y="0"/>
-          <a:ext cx="0" cy="0"/>
-          <a:chOff x="0" y="0"/>
-          <a:chExt cx="0" cy="0"/>
-        </a:xfrm>
-      </p:grpSpPr>
-      <p:sp>
-        <p:nvSpPr>
-          <p:cNvPr id="1358" name="Google Shape;1358;p89"/>
-          <p:cNvSpPr/>
-          <p:nvPr/>
-        </p:nvSpPr>
-        <p:spPr>
-          <a:xfrm>
-            <a:off x="1068701" y="3102202"/>
-            <a:ext cx="822886" cy="822886"/>
-          </a:xfrm>
-          <a:custGeom>
-            <a:avLst/>
-            <a:gdLst/>
-            <a:ahLst/>
-            <a:cxnLst/>
-            <a:rect l="l" t="t" r="r" b="b"/>
-            <a:pathLst>
-              <a:path w="16384" h="16384" extrusionOk="0">
-                <a:moveTo>
-                  <a:pt x="5198" y="16384"/>
-                </a:moveTo>
-                <a:cubicBezTo>
-                  <a:pt x="2341" y="16384"/>
-                  <a:pt x="1" y="14043"/>
-                  <a:pt x="1" y="11186"/>
-                </a:cubicBezTo>
-                <a:lnTo>
-                  <a:pt x="1" y="5198"/>
-                </a:lnTo>
-                <a:cubicBezTo>
-                  <a:pt x="1" y="2341"/>
-                  <a:pt x="2341" y="1"/>
-                  <a:pt x="5198" y="1"/>
-                </a:cubicBezTo>
-                <a:lnTo>
-                  <a:pt x="11186" y="1"/>
-                </a:lnTo>
-                <a:cubicBezTo>
-                  <a:pt x="14043" y="1"/>
-                  <a:pt x="16384" y="2341"/>
-                  <a:pt x="16384" y="5198"/>
-                </a:cubicBezTo>
-                <a:lnTo>
-                  <a:pt x="16384" y="11186"/>
-                </a:lnTo>
-                <a:cubicBezTo>
-                  <a:pt x="16384" y="14043"/>
-                  <a:pt x="14043" y="16384"/>
-                  <a:pt x="11186" y="16384"/>
-                </a:cubicBezTo>
-                <a:close/>
-              </a:path>
-            </a:pathLst>
-          </a:custGeom>
-          <a:gradFill>
-            <a:gsLst>
-              <a:gs pos="0">
-                <a:schemeClr val="accent2"/>
-              </a:gs>
-              <a:gs pos="100000">
-                <a:schemeClr val="accent3"/>
-              </a:gs>
-            </a:gsLst>
-            <a:lin ang="8100019" scaled="0"/>
-          </a:gradFill>
-          <a:ln w="9525" cap="flat" cmpd="sng">
-            <a:solidFill>
-              <a:schemeClr val="lt1"/>
-            </a:solidFill>
-            <a:prstDash val="solid"/>
-            <a:round/>
-            <a:headEnd type="none" w="sm" len="sm"/>
-            <a:tailEnd type="none" w="sm" len="sm"/>
-          </a:ln>
-        </p:spPr>
-        <p:txBody>
-          <a:bodyPr spcFirstLastPara="1" wrap="square" lIns="91425" tIns="91425" rIns="91425" bIns="91425" anchor="ctr" anchorCtr="0">
-            <a:noAutofit/>
-          </a:bodyPr>
-          <a:lstStyle/>
-          <a:p>
-            <a:pPr marL="0" marR="0" lvl="0" indent="0" algn="l" defTabSz="914400" rtl="0" eaLnBrk="1" fontAlgn="auto" latinLnBrk="0" hangingPunct="1">
-              <a:lnSpc>
-                <a:spcPct val="100000"/>
-              </a:lnSpc>
-              <a:spcBef>
-                <a:spcPts val="0"/>
-              </a:spcBef>
-              <a:spcAft>
-                <a:spcPts val="0"/>
-              </a:spcAft>
-              <a:buClr>
-                <a:srgbClr val="000000"/>
-              </a:buClr>
-              <a:buSzTx/>
-              <a:buFont typeface="Arial"/>
-              <a:buNone/>
-              <a:tabLst/>
-              <a:defRPr/>
-            </a:pPr>
-            <a:endParaRPr kumimoji="0" sz="1400" b="0" i="0" u="none" strike="noStrike" kern="0" cap="none" spc="0" normalizeH="0" baseline="0" noProof="0">
-              <a:ln>
-                <a:noFill/>
-              </a:ln>
-              <a:solidFill>
-                <a:srgbClr val="000000"/>
-              </a:solidFill>
-              <a:effectLst/>
-              <a:uLnTx/>
-              <a:uFillTx/>
-              <a:latin typeface="Arial"/>
-              <a:cs typeface="Arial"/>
-              <a:sym typeface="Arial"/>
-            </a:endParaRPr>
-          </a:p>
-        </p:txBody>
-      </p:sp>
-      <p:sp>
-        <p:nvSpPr>
-          <p:cNvPr id="1359" name="Google Shape;1359;p89"/>
-          <p:cNvSpPr/>
-          <p:nvPr/>
-        </p:nvSpPr>
-        <p:spPr>
-          <a:xfrm>
-            <a:off x="4868263" y="3102202"/>
-            <a:ext cx="822886" cy="822886"/>
-          </a:xfrm>
-          <a:custGeom>
-            <a:avLst/>
-            <a:gdLst/>
-            <a:ahLst/>
-            <a:cxnLst/>
-            <a:rect l="l" t="t" r="r" b="b"/>
-            <a:pathLst>
-              <a:path w="16384" h="16384" extrusionOk="0">
-                <a:moveTo>
-                  <a:pt x="5198" y="16384"/>
-                </a:moveTo>
-                <a:cubicBezTo>
-                  <a:pt x="2341" y="16384"/>
-                  <a:pt x="1" y="14043"/>
-                  <a:pt x="1" y="11186"/>
-                </a:cubicBezTo>
-                <a:lnTo>
-                  <a:pt x="1" y="5198"/>
-                </a:lnTo>
-                <a:cubicBezTo>
-                  <a:pt x="1" y="2341"/>
-                  <a:pt x="2341" y="1"/>
-                  <a:pt x="5198" y="1"/>
-                </a:cubicBezTo>
-                <a:lnTo>
-                  <a:pt x="11186" y="1"/>
-                </a:lnTo>
-                <a:cubicBezTo>
-                  <a:pt x="14043" y="1"/>
-                  <a:pt x="16384" y="2341"/>
-                  <a:pt x="16384" y="5198"/>
-                </a:cubicBezTo>
-                <a:lnTo>
-                  <a:pt x="16384" y="11186"/>
-                </a:lnTo>
-                <a:cubicBezTo>
-                  <a:pt x="16384" y="14043"/>
-                  <a:pt x="14043" y="16384"/>
-                  <a:pt x="11186" y="16384"/>
-                </a:cubicBezTo>
-                <a:close/>
-              </a:path>
-            </a:pathLst>
-          </a:custGeom>
-          <a:gradFill>
-            <a:gsLst>
-              <a:gs pos="0">
-                <a:schemeClr val="accent2"/>
-              </a:gs>
-              <a:gs pos="100000">
-                <a:schemeClr val="accent3"/>
-              </a:gs>
-            </a:gsLst>
-            <a:lin ang="8100019" scaled="0"/>
-          </a:gradFill>
-          <a:ln w="9525" cap="flat" cmpd="sng">
-            <a:solidFill>
-              <a:schemeClr val="lt1"/>
-            </a:solidFill>
-            <a:prstDash val="solid"/>
-            <a:round/>
-            <a:headEnd type="none" w="sm" len="sm"/>
-            <a:tailEnd type="none" w="sm" len="sm"/>
-          </a:ln>
-        </p:spPr>
-        <p:txBody>
-          <a:bodyPr spcFirstLastPara="1" wrap="square" lIns="91425" tIns="91425" rIns="91425" bIns="91425" anchor="ctr" anchorCtr="0">
-            <a:noAutofit/>
-          </a:bodyPr>
-          <a:lstStyle/>
-          <a:p>
-            <a:pPr marL="0" marR="0" lvl="0" indent="0" algn="l" defTabSz="914400" rtl="0" eaLnBrk="1" fontAlgn="auto" latinLnBrk="0" hangingPunct="1">
-              <a:lnSpc>
-                <a:spcPct val="100000"/>
-              </a:lnSpc>
-              <a:spcBef>
-                <a:spcPts val="0"/>
-              </a:spcBef>
-              <a:spcAft>
-                <a:spcPts val="0"/>
-              </a:spcAft>
-              <a:buClr>
-                <a:srgbClr val="000000"/>
-              </a:buClr>
-              <a:buSzTx/>
-              <a:buFont typeface="Arial"/>
-              <a:buNone/>
-              <a:tabLst/>
-              <a:defRPr/>
-            </a:pPr>
-            <a:endParaRPr kumimoji="0" sz="1400" b="0" i="0" u="none" strike="noStrike" kern="0" cap="none" spc="0" normalizeH="0" baseline="0" noProof="0">
-              <a:ln>
-                <a:noFill/>
-              </a:ln>
-              <a:solidFill>
-                <a:srgbClr val="000000"/>
-              </a:solidFill>
-              <a:effectLst/>
-              <a:uLnTx/>
-              <a:uFillTx/>
-              <a:latin typeface="Arial"/>
-              <a:cs typeface="Arial"/>
-              <a:sym typeface="Arial"/>
-            </a:endParaRPr>
-          </a:p>
-        </p:txBody>
-      </p:sp>
-      <p:sp>
-        <p:nvSpPr>
-          <p:cNvPr id="1360" name="Google Shape;1360;p89"/>
-          <p:cNvSpPr/>
-          <p:nvPr/>
-        </p:nvSpPr>
-        <p:spPr>
-          <a:xfrm>
-            <a:off x="4868276" y="1761552"/>
-            <a:ext cx="822886" cy="822886"/>
-          </a:xfrm>
-          <a:custGeom>
-            <a:avLst/>
-            <a:gdLst/>
-            <a:ahLst/>
-            <a:cxnLst/>
-            <a:rect l="l" t="t" r="r" b="b"/>
-            <a:pathLst>
-              <a:path w="16384" h="16384" extrusionOk="0">
-                <a:moveTo>
-                  <a:pt x="5198" y="16384"/>
-                </a:moveTo>
-                <a:cubicBezTo>
-                  <a:pt x="2341" y="16384"/>
-                  <a:pt x="1" y="14043"/>
-                  <a:pt x="1" y="11186"/>
-                </a:cubicBezTo>
-                <a:lnTo>
-                  <a:pt x="1" y="5198"/>
-                </a:lnTo>
-                <a:cubicBezTo>
-                  <a:pt x="1" y="2341"/>
-                  <a:pt x="2341" y="1"/>
-                  <a:pt x="5198" y="1"/>
-                </a:cubicBezTo>
-                <a:lnTo>
-                  <a:pt x="11186" y="1"/>
-                </a:lnTo>
-                <a:cubicBezTo>
-                  <a:pt x="14043" y="1"/>
-                  <a:pt x="16384" y="2341"/>
-                  <a:pt x="16384" y="5198"/>
-                </a:cubicBezTo>
-                <a:lnTo>
-                  <a:pt x="16384" y="11186"/>
-                </a:lnTo>
-                <a:cubicBezTo>
-                  <a:pt x="16384" y="14043"/>
-                  <a:pt x="14043" y="16384"/>
-                  <a:pt x="11186" y="16384"/>
-                </a:cubicBezTo>
-                <a:close/>
-              </a:path>
-            </a:pathLst>
-          </a:custGeom>
-          <a:gradFill>
-            <a:gsLst>
-              <a:gs pos="0">
-                <a:schemeClr val="accent2"/>
-              </a:gs>
-              <a:gs pos="100000">
-                <a:schemeClr val="accent3"/>
-              </a:gs>
-            </a:gsLst>
-            <a:lin ang="8100019" scaled="0"/>
-          </a:gradFill>
-          <a:ln w="9525" cap="flat" cmpd="sng">
-            <a:solidFill>
-              <a:schemeClr val="lt1"/>
-            </a:solidFill>
-            <a:prstDash val="solid"/>
-            <a:round/>
-            <a:headEnd type="none" w="sm" len="sm"/>
-            <a:tailEnd type="none" w="sm" len="sm"/>
-          </a:ln>
-        </p:spPr>
-        <p:txBody>
-          <a:bodyPr spcFirstLastPara="1" wrap="square" lIns="91425" tIns="91425" rIns="91425" bIns="91425" anchor="ctr" anchorCtr="0">
-            <a:noAutofit/>
-          </a:bodyPr>
-          <a:lstStyle/>
-          <a:p>
-            <a:pPr marL="0" marR="0" lvl="0" indent="0" algn="l" defTabSz="914400" rtl="0" eaLnBrk="1" fontAlgn="auto" latinLnBrk="0" hangingPunct="1">
-              <a:lnSpc>
-                <a:spcPct val="100000"/>
-              </a:lnSpc>
-              <a:spcBef>
-                <a:spcPts val="0"/>
-              </a:spcBef>
-              <a:spcAft>
-                <a:spcPts val="0"/>
-              </a:spcAft>
-              <a:buClr>
-                <a:srgbClr val="000000"/>
-              </a:buClr>
-              <a:buSzTx/>
-              <a:buFont typeface="Arial"/>
-              <a:buNone/>
-              <a:tabLst/>
-              <a:defRPr/>
-            </a:pPr>
-            <a:endParaRPr kumimoji="0" sz="1400" b="0" i="0" u="none" strike="noStrike" kern="0" cap="none" spc="0" normalizeH="0" baseline="0" noProof="0">
-              <a:ln>
-                <a:noFill/>
-              </a:ln>
-              <a:solidFill>
-                <a:srgbClr val="000000"/>
-              </a:solidFill>
-              <a:effectLst/>
-              <a:uLnTx/>
-              <a:uFillTx/>
-              <a:latin typeface="Arial"/>
-              <a:cs typeface="Arial"/>
-              <a:sym typeface="Arial"/>
-            </a:endParaRPr>
-          </a:p>
-        </p:txBody>
-      </p:sp>
-      <p:sp>
-        <p:nvSpPr>
-          <p:cNvPr id="1361" name="Google Shape;1361;p89"/>
-          <p:cNvSpPr/>
-          <p:nvPr/>
-        </p:nvSpPr>
-        <p:spPr>
-          <a:xfrm>
-            <a:off x="1068701" y="1761552"/>
-            <a:ext cx="822886" cy="822886"/>
-          </a:xfrm>
-          <a:custGeom>
-            <a:avLst/>
-            <a:gdLst/>
-            <a:ahLst/>
-            <a:cxnLst/>
-            <a:rect l="l" t="t" r="r" b="b"/>
-            <a:pathLst>
-              <a:path w="16384" h="16384" extrusionOk="0">
-                <a:moveTo>
-                  <a:pt x="5198" y="16384"/>
-                </a:moveTo>
-                <a:cubicBezTo>
-                  <a:pt x="2341" y="16384"/>
-                  <a:pt x="1" y="14043"/>
-                  <a:pt x="1" y="11186"/>
-                </a:cubicBezTo>
-                <a:lnTo>
-                  <a:pt x="1" y="5198"/>
-                </a:lnTo>
-                <a:cubicBezTo>
-                  <a:pt x="1" y="2341"/>
-                  <a:pt x="2341" y="1"/>
-                  <a:pt x="5198" y="1"/>
-                </a:cubicBezTo>
-                <a:lnTo>
-                  <a:pt x="11186" y="1"/>
-                </a:lnTo>
-                <a:cubicBezTo>
-                  <a:pt x="14043" y="1"/>
-                  <a:pt x="16384" y="2341"/>
-                  <a:pt x="16384" y="5198"/>
-                </a:cubicBezTo>
-                <a:lnTo>
-                  <a:pt x="16384" y="11186"/>
-                </a:lnTo>
-                <a:cubicBezTo>
-                  <a:pt x="16384" y="14043"/>
-                  <a:pt x="14043" y="16384"/>
-                  <a:pt x="11186" y="16384"/>
-                </a:cubicBezTo>
-                <a:close/>
-              </a:path>
-            </a:pathLst>
-          </a:custGeom>
-          <a:gradFill>
-            <a:gsLst>
-              <a:gs pos="0">
-                <a:schemeClr val="accent2"/>
-              </a:gs>
-              <a:gs pos="100000">
-                <a:schemeClr val="accent3"/>
-              </a:gs>
-            </a:gsLst>
-            <a:lin ang="8100019" scaled="0"/>
-          </a:gradFill>
-          <a:ln w="9525" cap="flat" cmpd="sng">
-            <a:solidFill>
-              <a:schemeClr val="lt1"/>
-            </a:solidFill>
-            <a:prstDash val="solid"/>
-            <a:round/>
-            <a:headEnd type="none" w="sm" len="sm"/>
-            <a:tailEnd type="none" w="sm" len="sm"/>
-          </a:ln>
-        </p:spPr>
-        <p:txBody>
-          <a:bodyPr spcFirstLastPara="1" wrap="square" lIns="91425" tIns="91425" rIns="91425" bIns="91425" anchor="ctr" anchorCtr="0">
-            <a:noAutofit/>
-          </a:bodyPr>
-          <a:lstStyle/>
-          <a:p>
-            <a:pPr marL="0" marR="0" lvl="0" indent="0" algn="l" defTabSz="914400" rtl="0" eaLnBrk="1" fontAlgn="auto" latinLnBrk="0" hangingPunct="1">
-              <a:lnSpc>
-                <a:spcPct val="100000"/>
-              </a:lnSpc>
-              <a:spcBef>
-                <a:spcPts val="0"/>
-              </a:spcBef>
-              <a:spcAft>
-                <a:spcPts val="0"/>
-              </a:spcAft>
-              <a:buClr>
-                <a:srgbClr val="000000"/>
-              </a:buClr>
-              <a:buSzTx/>
-              <a:buFont typeface="Arial"/>
-              <a:buNone/>
-              <a:tabLst/>
-              <a:defRPr/>
-            </a:pPr>
-            <a:endParaRPr kumimoji="0" sz="1400" b="0" i="0" u="none" strike="noStrike" kern="0" cap="none" spc="0" normalizeH="0" baseline="0" noProof="0">
-              <a:ln>
-                <a:noFill/>
-              </a:ln>
-              <a:solidFill>
-                <a:srgbClr val="000000"/>
-              </a:solidFill>
-              <a:effectLst/>
-              <a:uLnTx/>
-              <a:uFillTx/>
-              <a:latin typeface="Arial"/>
-              <a:cs typeface="Arial"/>
-              <a:sym typeface="Arial"/>
-            </a:endParaRPr>
-          </a:p>
-        </p:txBody>
-      </p:sp>
-      <p:sp>
-        <p:nvSpPr>
-          <p:cNvPr id="1362" name="Google Shape;1362;p89"/>
-          <p:cNvSpPr txBox="1">
-            <a:spLocks noGrp="1"/>
-          </p:cNvSpPr>
-          <p:nvPr>
-            <p:ph type="title" idx="4"/>
-          </p:nvPr>
-        </p:nvSpPr>
-        <p:spPr>
-          <a:xfrm>
-            <a:off x="2089762" y="3296445"/>
-            <a:ext cx="2580300" cy="434400"/>
-          </a:xfrm>
-          <a:prstGeom prst="rect">
-            <a:avLst/>
-          </a:prstGeom>
-        </p:spPr>
-        <p:txBody>
-          <a:bodyPr spcFirstLastPara="1" wrap="square" lIns="91425" tIns="91425" rIns="91425" bIns="91425" anchor="ctr" anchorCtr="0">
-            <a:noAutofit/>
-          </a:bodyPr>
-          <a:lstStyle/>
-          <a:p>
-            <a:pPr marL="0" lvl="0" indent="0" algn="l" rtl="0">
-              <a:spcBef>
-                <a:spcPts val="0"/>
-              </a:spcBef>
-              <a:spcAft>
-                <a:spcPts val="0"/>
-              </a:spcAft>
-              <a:buNone/>
-            </a:pPr>
-            <a:r>
-              <a:rPr lang="en" sz="1900" dirty="0"/>
-              <a:t>MODEL ANALYSIS</a:t>
-            </a:r>
-            <a:endParaRPr sz="1900" dirty="0"/>
-          </a:p>
-        </p:txBody>
-      </p:sp>
-      <p:sp>
-        <p:nvSpPr>
-          <p:cNvPr id="1364" name="Google Shape;1364;p89"/>
-          <p:cNvSpPr txBox="1">
-            <a:spLocks noGrp="1"/>
-          </p:cNvSpPr>
-          <p:nvPr>
-            <p:ph type="title" idx="7"/>
-          </p:nvPr>
-        </p:nvSpPr>
-        <p:spPr>
-          <a:xfrm>
-            <a:off x="1068700" y="1852888"/>
-            <a:ext cx="822900" cy="640200"/>
-          </a:xfrm>
-          <a:prstGeom prst="rect">
-            <a:avLst/>
-          </a:prstGeom>
-          <a:noFill/>
-        </p:spPr>
-        <p:txBody>
-          <a:bodyPr spcFirstLastPara="1" wrap="square" lIns="91425" tIns="91425" rIns="91425" bIns="91425" anchor="ctr" anchorCtr="0">
-            <a:noAutofit/>
-          </a:bodyPr>
-          <a:lstStyle/>
-          <a:p>
-            <a:pPr marL="0" lvl="0" indent="0" algn="ctr" rtl="0">
-              <a:spcBef>
-                <a:spcPts val="0"/>
-              </a:spcBef>
-              <a:spcAft>
-                <a:spcPts val="0"/>
-              </a:spcAft>
-              <a:buNone/>
-            </a:pPr>
-            <a:r>
-              <a:rPr lang="en"/>
-              <a:t>01</a:t>
-            </a:r>
-            <a:endParaRPr/>
-          </a:p>
-        </p:txBody>
-      </p:sp>
-      <p:sp>
-        <p:nvSpPr>
-          <p:cNvPr id="1365" name="Google Shape;1365;p89"/>
-          <p:cNvSpPr txBox="1">
-            <a:spLocks noGrp="1"/>
-          </p:cNvSpPr>
-          <p:nvPr>
-            <p:ph type="title"/>
-          </p:nvPr>
-        </p:nvSpPr>
-        <p:spPr>
-          <a:xfrm>
-            <a:off x="1991675" y="1899775"/>
-            <a:ext cx="2580300" cy="434400"/>
-          </a:xfrm>
-          <a:prstGeom prst="rect">
-            <a:avLst/>
-          </a:prstGeom>
-        </p:spPr>
-        <p:txBody>
-          <a:bodyPr spcFirstLastPara="1" wrap="square" lIns="91425" tIns="91425" rIns="91425" bIns="91425" anchor="ctr" anchorCtr="0">
-            <a:noAutofit/>
-          </a:bodyPr>
-          <a:lstStyle/>
-          <a:p>
-            <a:pPr marL="0" lvl="0" indent="0" algn="l" rtl="0">
-              <a:spcBef>
-                <a:spcPts val="0"/>
-              </a:spcBef>
-              <a:spcAft>
-                <a:spcPts val="0"/>
-              </a:spcAft>
-              <a:buNone/>
-            </a:pPr>
-            <a:r>
-              <a:rPr lang="en" sz="1900" dirty="0"/>
-              <a:t>INTRODUCTION</a:t>
-            </a:r>
-            <a:endParaRPr sz="1900" dirty="0"/>
-          </a:p>
-        </p:txBody>
-      </p:sp>
-      <p:sp>
-        <p:nvSpPr>
-          <p:cNvPr id="1366" name="Google Shape;1366;p89"/>
-          <p:cNvSpPr txBox="1">
-            <a:spLocks noGrp="1"/>
-          </p:cNvSpPr>
-          <p:nvPr>
-            <p:ph type="title" idx="2"/>
-          </p:nvPr>
-        </p:nvSpPr>
-        <p:spPr>
-          <a:xfrm>
-            <a:off x="5786525" y="1899775"/>
-            <a:ext cx="2580300" cy="434400"/>
-          </a:xfrm>
-          <a:prstGeom prst="rect">
-            <a:avLst/>
-          </a:prstGeom>
-        </p:spPr>
-        <p:txBody>
-          <a:bodyPr spcFirstLastPara="1" wrap="square" lIns="91425" tIns="91425" rIns="91425" bIns="91425" anchor="ctr" anchorCtr="0">
-            <a:noAutofit/>
-          </a:bodyPr>
-          <a:lstStyle/>
-          <a:p>
-            <a:pPr marL="0" lvl="0" indent="0" algn="l" rtl="0">
-              <a:spcBef>
-                <a:spcPts val="0"/>
-              </a:spcBef>
-              <a:spcAft>
-                <a:spcPts val="0"/>
-              </a:spcAft>
-              <a:buNone/>
-            </a:pPr>
-            <a:r>
-              <a:rPr lang="en" sz="1900" dirty="0"/>
-              <a:t>APPLICATION</a:t>
-            </a:r>
-            <a:endParaRPr sz="1900" dirty="0"/>
-          </a:p>
-        </p:txBody>
-      </p:sp>
-      <p:sp>
-        <p:nvSpPr>
-          <p:cNvPr id="1368" name="Google Shape;1368;p89"/>
-          <p:cNvSpPr txBox="1">
-            <a:spLocks noGrp="1"/>
-          </p:cNvSpPr>
-          <p:nvPr>
-            <p:ph type="title" idx="5"/>
-          </p:nvPr>
-        </p:nvSpPr>
-        <p:spPr>
-          <a:xfrm>
-            <a:off x="5786525" y="2879926"/>
-            <a:ext cx="3357476" cy="1288548"/>
-          </a:xfrm>
-          <a:prstGeom prst="rect">
-            <a:avLst/>
-          </a:prstGeom>
-        </p:spPr>
-        <p:txBody>
-          <a:bodyPr spcFirstLastPara="1" wrap="square" lIns="91425" tIns="91425" rIns="91425" bIns="91425" anchor="ctr" anchorCtr="0">
-            <a:noAutofit/>
-          </a:bodyPr>
-          <a:lstStyle/>
-          <a:p>
-            <a:pPr marL="0" lvl="0" indent="0" algn="l" rtl="0">
-              <a:spcBef>
-                <a:spcPts val="0"/>
-              </a:spcBef>
-              <a:spcAft>
-                <a:spcPts val="0"/>
-              </a:spcAft>
-              <a:buNone/>
-            </a:pPr>
-            <a:r>
-              <a:rPr lang="it-IT" sz="1900" dirty="0"/>
-              <a:t>POWER CONSUMPTION ANALYSIS</a:t>
-            </a:r>
-            <a:endParaRPr sz="1900" dirty="0"/>
-          </a:p>
-        </p:txBody>
-      </p:sp>
-      <p:sp>
-        <p:nvSpPr>
-          <p:cNvPr id="1370" name="Google Shape;1370;p89"/>
-          <p:cNvSpPr txBox="1">
-            <a:spLocks noGrp="1"/>
-          </p:cNvSpPr>
-          <p:nvPr>
-            <p:ph type="title" idx="8"/>
-          </p:nvPr>
-        </p:nvSpPr>
-        <p:spPr>
-          <a:xfrm>
-            <a:off x="4868250" y="1858800"/>
-            <a:ext cx="822900" cy="640200"/>
-          </a:xfrm>
-          <a:prstGeom prst="rect">
-            <a:avLst/>
-          </a:prstGeom>
-          <a:noFill/>
-        </p:spPr>
-        <p:txBody>
-          <a:bodyPr spcFirstLastPara="1" wrap="square" lIns="91425" tIns="91425" rIns="91425" bIns="91425" anchor="ctr" anchorCtr="0">
-            <a:noAutofit/>
-          </a:bodyPr>
-          <a:lstStyle/>
-          <a:p>
-            <a:pPr marL="0" lvl="0" indent="0" algn="ctr" rtl="0">
-              <a:spcBef>
-                <a:spcPts val="0"/>
-              </a:spcBef>
-              <a:spcAft>
-                <a:spcPts val="0"/>
-              </a:spcAft>
-              <a:buNone/>
-            </a:pPr>
-            <a:r>
-              <a:rPr lang="en"/>
-              <a:t>02</a:t>
-            </a:r>
-            <a:endParaRPr/>
-          </a:p>
-        </p:txBody>
-      </p:sp>
-      <p:sp>
-        <p:nvSpPr>
-          <p:cNvPr id="1371" name="Google Shape;1371;p89"/>
-          <p:cNvSpPr txBox="1">
-            <a:spLocks noGrp="1"/>
-          </p:cNvSpPr>
-          <p:nvPr>
-            <p:ph type="title" idx="9"/>
-          </p:nvPr>
-        </p:nvSpPr>
-        <p:spPr>
-          <a:xfrm>
-            <a:off x="1068700" y="3193550"/>
-            <a:ext cx="822900" cy="640200"/>
-          </a:xfrm>
-          <a:prstGeom prst="rect">
-            <a:avLst/>
-          </a:prstGeom>
-          <a:noFill/>
-        </p:spPr>
-        <p:txBody>
-          <a:bodyPr spcFirstLastPara="1" wrap="square" lIns="91425" tIns="91425" rIns="91425" bIns="91425" anchor="ctr" anchorCtr="0">
-            <a:noAutofit/>
-          </a:bodyPr>
-          <a:lstStyle/>
-          <a:p>
-            <a:pPr marL="0" lvl="0" indent="0" algn="ctr" rtl="0">
-              <a:spcBef>
-                <a:spcPts val="0"/>
-              </a:spcBef>
-              <a:spcAft>
-                <a:spcPts val="0"/>
-              </a:spcAft>
-              <a:buNone/>
-            </a:pPr>
-            <a:r>
-              <a:rPr lang="en"/>
-              <a:t>03</a:t>
-            </a:r>
-            <a:endParaRPr/>
-          </a:p>
-        </p:txBody>
-      </p:sp>
-      <p:sp>
-        <p:nvSpPr>
-          <p:cNvPr id="1372" name="Google Shape;1372;p89"/>
-          <p:cNvSpPr txBox="1">
-            <a:spLocks noGrp="1"/>
-          </p:cNvSpPr>
-          <p:nvPr>
-            <p:ph type="title" idx="13"/>
-          </p:nvPr>
-        </p:nvSpPr>
-        <p:spPr>
-          <a:xfrm>
-            <a:off x="4868250" y="3198175"/>
-            <a:ext cx="822900" cy="640200"/>
-          </a:xfrm>
-          <a:prstGeom prst="rect">
-            <a:avLst/>
-          </a:prstGeom>
-          <a:noFill/>
-        </p:spPr>
-        <p:txBody>
-          <a:bodyPr spcFirstLastPara="1" wrap="square" lIns="91425" tIns="91425" rIns="91425" bIns="91425" anchor="ctr" anchorCtr="0">
-            <a:noAutofit/>
-          </a:bodyPr>
-          <a:lstStyle/>
-          <a:p>
-            <a:pPr marL="0" lvl="0" indent="0" algn="ctr" rtl="0">
-              <a:spcBef>
-                <a:spcPts val="0"/>
-              </a:spcBef>
-              <a:spcAft>
-                <a:spcPts val="0"/>
-              </a:spcAft>
-              <a:buNone/>
-            </a:pPr>
-            <a:r>
-              <a:rPr lang="en"/>
-              <a:t>04</a:t>
-            </a:r>
-            <a:endParaRPr/>
-          </a:p>
-        </p:txBody>
-      </p:sp>
-      <p:sp>
-        <p:nvSpPr>
-          <p:cNvPr id="1373" name="Google Shape;1373;p89"/>
-          <p:cNvSpPr txBox="1">
-            <a:spLocks noGrp="1"/>
-          </p:cNvSpPr>
-          <p:nvPr>
-            <p:ph type="title" idx="15"/>
-          </p:nvPr>
-        </p:nvSpPr>
-        <p:spPr>
-          <a:xfrm>
-            <a:off x="713225" y="657995"/>
-            <a:ext cx="7717500" cy="363000"/>
-          </a:xfrm>
-          <a:prstGeom prst="rect">
-            <a:avLst/>
-          </a:prstGeom>
-        </p:spPr>
-        <p:txBody>
-          <a:bodyPr spcFirstLastPara="1" wrap="square" lIns="91425" tIns="91425" rIns="91425" bIns="91425" anchor="ctr" anchorCtr="0">
-            <a:noAutofit/>
-          </a:bodyPr>
-          <a:lstStyle/>
-          <a:p>
-            <a:pPr marL="0" lvl="0" indent="0" algn="ctr" rtl="0">
-              <a:spcBef>
-                <a:spcPts val="0"/>
-              </a:spcBef>
-              <a:spcAft>
-                <a:spcPts val="0"/>
-              </a:spcAft>
-              <a:buNone/>
-            </a:pPr>
-            <a:r>
-              <a:rPr lang="en"/>
-              <a:t>TABLE OF CONTENTS</a:t>
-            </a:r>
-            <a:endParaRPr/>
-          </a:p>
-        </p:txBody>
-      </p:sp>
-      <p:grpSp>
-        <p:nvGrpSpPr>
-          <p:cNvPr id="1375" name="Google Shape;1375;p89"/>
-          <p:cNvGrpSpPr/>
-          <p:nvPr/>
-        </p:nvGrpSpPr>
-        <p:grpSpPr>
-          <a:xfrm rot="1285550">
-            <a:off x="7808042" y="678921"/>
-            <a:ext cx="822913" cy="818353"/>
-            <a:chOff x="5088175" y="2529243"/>
-            <a:chExt cx="822905" cy="818345"/>
-          </a:xfrm>
-        </p:grpSpPr>
-        <p:sp>
-          <p:nvSpPr>
-            <p:cNvPr id="1376" name="Google Shape;1376;p89"/>
-            <p:cNvSpPr/>
-            <p:nvPr/>
-          </p:nvSpPr>
-          <p:spPr>
-            <a:xfrm>
-              <a:off x="5092588" y="2529243"/>
-              <a:ext cx="818492" cy="818345"/>
-            </a:xfrm>
-            <a:custGeom>
-              <a:avLst/>
-              <a:gdLst/>
-              <a:ahLst/>
-              <a:cxnLst/>
-              <a:rect l="l" t="t" r="r" b="b"/>
-              <a:pathLst>
-                <a:path w="5564" h="5563" fill="none" extrusionOk="0">
-                  <a:moveTo>
-                    <a:pt x="5563" y="2766"/>
-                  </a:moveTo>
-                  <a:cubicBezTo>
-                    <a:pt x="5563" y="4317"/>
-                    <a:pt x="4317" y="5563"/>
-                    <a:pt x="2767" y="5563"/>
-                  </a:cubicBezTo>
-                  <a:cubicBezTo>
-                    <a:pt x="1217" y="5563"/>
-                    <a:pt x="1" y="4317"/>
-                    <a:pt x="1" y="2766"/>
-                  </a:cubicBezTo>
-                  <a:cubicBezTo>
-                    <a:pt x="1" y="1247"/>
-                    <a:pt x="1217" y="0"/>
-                    <a:pt x="2767" y="0"/>
-                  </a:cubicBezTo>
-                  <a:cubicBezTo>
-                    <a:pt x="4317" y="0"/>
-                    <a:pt x="5563" y="1247"/>
-                    <a:pt x="5563" y="2766"/>
-                  </a:cubicBezTo>
-                  <a:close/>
-                </a:path>
-              </a:pathLst>
-            </a:custGeom>
-            <a:noFill/>
-            <a:ln w="9525" cap="flat" cmpd="sng">
-              <a:solidFill>
-                <a:schemeClr val="accent2"/>
-              </a:solidFill>
-              <a:prstDash val="solid"/>
-              <a:miter lim="30395"/>
-              <a:headEnd type="none" w="sm" len="sm"/>
-              <a:tailEnd type="none" w="sm" len="sm"/>
-            </a:ln>
-          </p:spPr>
-          <p:txBody>
-            <a:bodyPr spcFirstLastPara="1" wrap="square" lIns="91425" tIns="91425" rIns="91425" bIns="91425" anchor="ctr" anchorCtr="0">
-              <a:noAutofit/>
-            </a:bodyPr>
-            <a:lstStyle/>
-            <a:p>
-              <a:pPr marL="0" marR="0" lvl="0" indent="0" algn="l" defTabSz="914400" rtl="0" eaLnBrk="1" fontAlgn="auto" latinLnBrk="0" hangingPunct="1">
-                <a:lnSpc>
-                  <a:spcPct val="100000"/>
-                </a:lnSpc>
-                <a:spcBef>
-                  <a:spcPts val="0"/>
-                </a:spcBef>
-                <a:spcAft>
-                  <a:spcPts val="0"/>
-                </a:spcAft>
-                <a:buClr>
-                  <a:srgbClr val="000000"/>
-                </a:buClr>
-                <a:buSzTx/>
-                <a:buFont typeface="Arial"/>
-                <a:buNone/>
-                <a:tabLst/>
-                <a:defRPr/>
-              </a:pPr>
-              <a:endParaRPr kumimoji="0" sz="1400" b="0" i="0" u="none" strike="noStrike" kern="0" cap="none" spc="0" normalizeH="0" baseline="0" noProof="0">
-                <a:ln>
-                  <a:noFill/>
-                </a:ln>
-                <a:solidFill>
-                  <a:srgbClr val="000000"/>
-                </a:solidFill>
-                <a:effectLst/>
-                <a:uLnTx/>
-                <a:uFillTx/>
-                <a:latin typeface="Arial"/>
-                <a:cs typeface="Arial"/>
-                <a:sym typeface="Arial"/>
-              </a:endParaRPr>
-            </a:p>
-          </p:txBody>
-        </p:sp>
-        <p:sp>
-          <p:nvSpPr>
-            <p:cNvPr id="1377" name="Google Shape;1377;p89"/>
-            <p:cNvSpPr/>
-            <p:nvPr/>
-          </p:nvSpPr>
-          <p:spPr>
-            <a:xfrm>
-              <a:off x="5499478" y="2529243"/>
-              <a:ext cx="147" cy="818345"/>
-            </a:xfrm>
-            <a:custGeom>
-              <a:avLst/>
-              <a:gdLst/>
-              <a:ahLst/>
-              <a:cxnLst/>
-              <a:rect l="l" t="t" r="r" b="b"/>
-              <a:pathLst>
-                <a:path w="1" h="5563" fill="none" extrusionOk="0">
-                  <a:moveTo>
-                    <a:pt x="1" y="0"/>
-                  </a:moveTo>
-                  <a:lnTo>
-                    <a:pt x="1" y="5563"/>
-                  </a:lnTo>
-                </a:path>
-              </a:pathLst>
-            </a:custGeom>
-            <a:noFill/>
-            <a:ln w="9525" cap="flat" cmpd="sng">
-              <a:solidFill>
-                <a:schemeClr val="accent2"/>
-              </a:solidFill>
-              <a:prstDash val="solid"/>
-              <a:miter lim="30395"/>
-              <a:headEnd type="none" w="sm" len="sm"/>
-              <a:tailEnd type="none" w="sm" len="sm"/>
-            </a:ln>
-          </p:spPr>
-          <p:txBody>
-            <a:bodyPr spcFirstLastPara="1" wrap="square" lIns="91425" tIns="91425" rIns="91425" bIns="91425" anchor="ctr" anchorCtr="0">
-              <a:noAutofit/>
-            </a:bodyPr>
-            <a:lstStyle/>
-            <a:p>
-              <a:pPr marL="0" marR="0" lvl="0" indent="0" algn="l" defTabSz="914400" rtl="0" eaLnBrk="1" fontAlgn="auto" latinLnBrk="0" hangingPunct="1">
-                <a:lnSpc>
-                  <a:spcPct val="100000"/>
-                </a:lnSpc>
-                <a:spcBef>
-                  <a:spcPts val="0"/>
-                </a:spcBef>
-                <a:spcAft>
-                  <a:spcPts val="0"/>
-                </a:spcAft>
-                <a:buClr>
-                  <a:srgbClr val="000000"/>
-                </a:buClr>
-                <a:buSzTx/>
-                <a:buFont typeface="Arial"/>
-                <a:buNone/>
-                <a:tabLst/>
-                <a:defRPr/>
-              </a:pPr>
-              <a:endParaRPr kumimoji="0" sz="1400" b="0" i="0" u="none" strike="noStrike" kern="0" cap="none" spc="0" normalizeH="0" baseline="0" noProof="0">
-                <a:ln>
-                  <a:noFill/>
-                </a:ln>
-                <a:solidFill>
-                  <a:srgbClr val="000000"/>
-                </a:solidFill>
-                <a:effectLst/>
-                <a:uLnTx/>
-                <a:uFillTx/>
-                <a:latin typeface="Arial"/>
-                <a:cs typeface="Arial"/>
-                <a:sym typeface="Arial"/>
-              </a:endParaRPr>
-            </a:p>
-          </p:txBody>
-        </p:sp>
-        <p:sp>
-          <p:nvSpPr>
-            <p:cNvPr id="1378" name="Google Shape;1378;p89"/>
-            <p:cNvSpPr/>
-            <p:nvPr/>
-          </p:nvSpPr>
-          <p:spPr>
-            <a:xfrm>
-              <a:off x="5307213" y="2533656"/>
-              <a:ext cx="134307" cy="809519"/>
-            </a:xfrm>
-            <a:custGeom>
-              <a:avLst/>
-              <a:gdLst/>
-              <a:ahLst/>
-              <a:cxnLst/>
-              <a:rect l="l" t="t" r="r" b="b"/>
-              <a:pathLst>
-                <a:path w="913" h="5503" fill="none" extrusionOk="0">
-                  <a:moveTo>
-                    <a:pt x="913" y="5502"/>
-                  </a:moveTo>
-                  <a:cubicBezTo>
-                    <a:pt x="913" y="5502"/>
-                    <a:pt x="1" y="4712"/>
-                    <a:pt x="1" y="2736"/>
-                  </a:cubicBezTo>
-                  <a:cubicBezTo>
-                    <a:pt x="1" y="791"/>
-                    <a:pt x="913" y="1"/>
-                    <a:pt x="913" y="1"/>
-                  </a:cubicBezTo>
-                </a:path>
-              </a:pathLst>
-            </a:custGeom>
-            <a:noFill/>
-            <a:ln w="9525" cap="flat" cmpd="sng">
-              <a:solidFill>
-                <a:schemeClr val="accent2"/>
-              </a:solidFill>
-              <a:prstDash val="solid"/>
-              <a:miter lim="30395"/>
-              <a:headEnd type="none" w="sm" len="sm"/>
-              <a:tailEnd type="none" w="sm" len="sm"/>
-            </a:ln>
-          </p:spPr>
-          <p:txBody>
-            <a:bodyPr spcFirstLastPara="1" wrap="square" lIns="91425" tIns="91425" rIns="91425" bIns="91425" anchor="ctr" anchorCtr="0">
-              <a:noAutofit/>
-            </a:bodyPr>
-            <a:lstStyle/>
-            <a:p>
-              <a:pPr marL="0" marR="0" lvl="0" indent="0" algn="l" defTabSz="914400" rtl="0" eaLnBrk="1" fontAlgn="auto" latinLnBrk="0" hangingPunct="1">
-                <a:lnSpc>
-                  <a:spcPct val="100000"/>
-                </a:lnSpc>
-                <a:spcBef>
-                  <a:spcPts val="0"/>
-                </a:spcBef>
-                <a:spcAft>
-                  <a:spcPts val="0"/>
-                </a:spcAft>
-                <a:buClr>
-                  <a:srgbClr val="000000"/>
-                </a:buClr>
-                <a:buSzTx/>
-                <a:buFont typeface="Arial"/>
-                <a:buNone/>
-                <a:tabLst/>
-                <a:defRPr/>
-              </a:pPr>
-              <a:endParaRPr kumimoji="0" sz="1400" b="0" i="0" u="none" strike="noStrike" kern="0" cap="none" spc="0" normalizeH="0" baseline="0" noProof="0">
-                <a:ln>
-                  <a:noFill/>
-                </a:ln>
-                <a:solidFill>
-                  <a:srgbClr val="000000"/>
-                </a:solidFill>
-                <a:effectLst/>
-                <a:uLnTx/>
-                <a:uFillTx/>
-                <a:latin typeface="Arial"/>
-                <a:cs typeface="Arial"/>
-                <a:sym typeface="Arial"/>
-              </a:endParaRPr>
-            </a:p>
-          </p:txBody>
-        </p:sp>
-        <p:sp>
-          <p:nvSpPr>
-            <p:cNvPr id="1379" name="Google Shape;1379;p89"/>
-            <p:cNvSpPr/>
-            <p:nvPr/>
-          </p:nvSpPr>
-          <p:spPr>
-            <a:xfrm>
-              <a:off x="5562144" y="2533656"/>
-              <a:ext cx="134307" cy="809519"/>
-            </a:xfrm>
-            <a:custGeom>
-              <a:avLst/>
-              <a:gdLst/>
-              <a:ahLst/>
-              <a:cxnLst/>
-              <a:rect l="l" t="t" r="r" b="b"/>
-              <a:pathLst>
-                <a:path w="913" h="5503" fill="none" extrusionOk="0">
-                  <a:moveTo>
-                    <a:pt x="0" y="5502"/>
-                  </a:moveTo>
-                  <a:cubicBezTo>
-                    <a:pt x="0" y="5502"/>
-                    <a:pt x="912" y="4712"/>
-                    <a:pt x="912" y="2736"/>
-                  </a:cubicBezTo>
-                  <a:cubicBezTo>
-                    <a:pt x="912" y="791"/>
-                    <a:pt x="0" y="1"/>
-                    <a:pt x="0" y="1"/>
-                  </a:cubicBezTo>
-                </a:path>
-              </a:pathLst>
-            </a:custGeom>
-            <a:noFill/>
-            <a:ln w="9525" cap="flat" cmpd="sng">
-              <a:solidFill>
-                <a:schemeClr val="accent2"/>
-              </a:solidFill>
-              <a:prstDash val="solid"/>
-              <a:miter lim="30395"/>
-              <a:headEnd type="none" w="sm" len="sm"/>
-              <a:tailEnd type="none" w="sm" len="sm"/>
-            </a:ln>
-          </p:spPr>
-          <p:txBody>
-            <a:bodyPr spcFirstLastPara="1" wrap="square" lIns="91425" tIns="91425" rIns="91425" bIns="91425" anchor="ctr" anchorCtr="0">
-              <a:noAutofit/>
-            </a:bodyPr>
-            <a:lstStyle/>
-            <a:p>
-              <a:pPr marL="0" marR="0" lvl="0" indent="0" algn="l" defTabSz="914400" rtl="0" eaLnBrk="1" fontAlgn="auto" latinLnBrk="0" hangingPunct="1">
-                <a:lnSpc>
-                  <a:spcPct val="100000"/>
-                </a:lnSpc>
-                <a:spcBef>
-                  <a:spcPts val="0"/>
-                </a:spcBef>
-                <a:spcAft>
-                  <a:spcPts val="0"/>
-                </a:spcAft>
-                <a:buClr>
-                  <a:srgbClr val="000000"/>
-                </a:buClr>
-                <a:buSzTx/>
-                <a:buFont typeface="Arial"/>
-                <a:buNone/>
-                <a:tabLst/>
-                <a:defRPr/>
-              </a:pPr>
-              <a:endParaRPr kumimoji="0" sz="1400" b="0" i="0" u="none" strike="noStrike" kern="0" cap="none" spc="0" normalizeH="0" baseline="0" noProof="0">
-                <a:ln>
-                  <a:noFill/>
-                </a:ln>
-                <a:solidFill>
-                  <a:srgbClr val="000000"/>
-                </a:solidFill>
-                <a:effectLst/>
-                <a:uLnTx/>
-                <a:uFillTx/>
-                <a:latin typeface="Arial"/>
-                <a:cs typeface="Arial"/>
-                <a:sym typeface="Arial"/>
-              </a:endParaRPr>
-            </a:p>
-          </p:txBody>
-        </p:sp>
-        <p:sp>
-          <p:nvSpPr>
-            <p:cNvPr id="1380" name="Google Shape;1380;p89"/>
-            <p:cNvSpPr/>
-            <p:nvPr/>
-          </p:nvSpPr>
-          <p:spPr>
-            <a:xfrm>
-              <a:off x="5088175" y="2936132"/>
-              <a:ext cx="822905" cy="147"/>
-            </a:xfrm>
-            <a:custGeom>
-              <a:avLst/>
-              <a:gdLst/>
-              <a:ahLst/>
-              <a:cxnLst/>
-              <a:rect l="l" t="t" r="r" b="b"/>
-              <a:pathLst>
-                <a:path w="5594" h="1" fill="none" extrusionOk="0">
-                  <a:moveTo>
-                    <a:pt x="0" y="0"/>
-                  </a:moveTo>
-                  <a:lnTo>
-                    <a:pt x="5593" y="0"/>
-                  </a:lnTo>
-                </a:path>
-              </a:pathLst>
-            </a:custGeom>
-            <a:noFill/>
-            <a:ln w="9525" cap="flat" cmpd="sng">
-              <a:solidFill>
-                <a:schemeClr val="accent2"/>
-              </a:solidFill>
-              <a:prstDash val="solid"/>
-              <a:miter lim="30395"/>
-              <a:headEnd type="none" w="sm" len="sm"/>
-              <a:tailEnd type="none" w="sm" len="sm"/>
-            </a:ln>
-          </p:spPr>
-          <p:txBody>
-            <a:bodyPr spcFirstLastPara="1" wrap="square" lIns="91425" tIns="91425" rIns="91425" bIns="91425" anchor="ctr" anchorCtr="0">
-              <a:noAutofit/>
-            </a:bodyPr>
-            <a:lstStyle/>
-            <a:p>
-              <a:pPr marL="0" marR="0" lvl="0" indent="0" algn="l" defTabSz="914400" rtl="0" eaLnBrk="1" fontAlgn="auto" latinLnBrk="0" hangingPunct="1">
-                <a:lnSpc>
-                  <a:spcPct val="100000"/>
-                </a:lnSpc>
-                <a:spcBef>
-                  <a:spcPts val="0"/>
-                </a:spcBef>
-                <a:spcAft>
-                  <a:spcPts val="0"/>
-                </a:spcAft>
-                <a:buClr>
-                  <a:srgbClr val="000000"/>
-                </a:buClr>
-                <a:buSzTx/>
-                <a:buFont typeface="Arial"/>
-                <a:buNone/>
-                <a:tabLst/>
-                <a:defRPr/>
-              </a:pPr>
-              <a:endParaRPr kumimoji="0" sz="1400" b="0" i="0" u="none" strike="noStrike" kern="0" cap="none" spc="0" normalizeH="0" baseline="0" noProof="0">
-                <a:ln>
-                  <a:noFill/>
-                </a:ln>
-                <a:solidFill>
-                  <a:srgbClr val="000000"/>
-                </a:solidFill>
-                <a:effectLst/>
-                <a:uLnTx/>
-                <a:uFillTx/>
-                <a:latin typeface="Arial"/>
-                <a:cs typeface="Arial"/>
-                <a:sym typeface="Arial"/>
-              </a:endParaRPr>
-            </a:p>
-          </p:txBody>
-        </p:sp>
-        <p:sp>
-          <p:nvSpPr>
-            <p:cNvPr id="1381" name="Google Shape;1381;p89"/>
-            <p:cNvSpPr/>
-            <p:nvPr/>
-          </p:nvSpPr>
-          <p:spPr>
-            <a:xfrm>
-              <a:off x="5191001" y="3128397"/>
-              <a:ext cx="626079" cy="67227"/>
-            </a:xfrm>
-            <a:custGeom>
-              <a:avLst/>
-              <a:gdLst/>
-              <a:ahLst/>
-              <a:cxnLst/>
-              <a:rect l="l" t="t" r="r" b="b"/>
-              <a:pathLst>
-                <a:path w="4256" h="457" fill="none" extrusionOk="0">
-                  <a:moveTo>
-                    <a:pt x="4256" y="456"/>
-                  </a:moveTo>
-                  <a:cubicBezTo>
-                    <a:pt x="3830" y="244"/>
-                    <a:pt x="3101" y="0"/>
-                    <a:pt x="2098" y="0"/>
-                  </a:cubicBezTo>
-                  <a:cubicBezTo>
-                    <a:pt x="1125" y="0"/>
-                    <a:pt x="426" y="213"/>
-                    <a:pt x="1" y="456"/>
-                  </a:cubicBezTo>
-                </a:path>
-              </a:pathLst>
-            </a:custGeom>
-            <a:noFill/>
-            <a:ln w="9525" cap="flat" cmpd="sng">
-              <a:solidFill>
-                <a:schemeClr val="accent2"/>
-              </a:solidFill>
-              <a:prstDash val="solid"/>
-              <a:miter lim="30395"/>
-              <a:headEnd type="none" w="sm" len="sm"/>
-              <a:tailEnd type="none" w="sm" len="sm"/>
-            </a:ln>
-          </p:spPr>
-          <p:txBody>
-            <a:bodyPr spcFirstLastPara="1" wrap="square" lIns="91425" tIns="91425" rIns="91425" bIns="91425" anchor="ctr" anchorCtr="0">
-              <a:noAutofit/>
-            </a:bodyPr>
-            <a:lstStyle/>
-            <a:p>
-              <a:pPr marL="0" marR="0" lvl="0" indent="0" algn="l" defTabSz="914400" rtl="0" eaLnBrk="1" fontAlgn="auto" latinLnBrk="0" hangingPunct="1">
-                <a:lnSpc>
-                  <a:spcPct val="100000"/>
-                </a:lnSpc>
-                <a:spcBef>
-                  <a:spcPts val="0"/>
-                </a:spcBef>
-                <a:spcAft>
-                  <a:spcPts val="0"/>
-                </a:spcAft>
-                <a:buClr>
-                  <a:srgbClr val="000000"/>
-                </a:buClr>
-                <a:buSzTx/>
-                <a:buFont typeface="Arial"/>
-                <a:buNone/>
-                <a:tabLst/>
-                <a:defRPr/>
-              </a:pPr>
-              <a:endParaRPr kumimoji="0" sz="1400" b="0" i="0" u="none" strike="noStrike" kern="0" cap="none" spc="0" normalizeH="0" baseline="0" noProof="0">
-                <a:ln>
-                  <a:noFill/>
-                </a:ln>
-                <a:solidFill>
-                  <a:srgbClr val="000000"/>
-                </a:solidFill>
-                <a:effectLst/>
-                <a:uLnTx/>
-                <a:uFillTx/>
-                <a:latin typeface="Arial"/>
-                <a:cs typeface="Arial"/>
-                <a:sym typeface="Arial"/>
-              </a:endParaRPr>
-            </a:p>
-          </p:txBody>
-        </p:sp>
-        <p:sp>
-          <p:nvSpPr>
-            <p:cNvPr id="1382" name="Google Shape;1382;p89"/>
-            <p:cNvSpPr/>
-            <p:nvPr/>
-          </p:nvSpPr>
-          <p:spPr>
-            <a:xfrm>
-              <a:off x="5191001" y="2694735"/>
-              <a:ext cx="626079" cy="71640"/>
-            </a:xfrm>
-            <a:custGeom>
-              <a:avLst/>
-              <a:gdLst/>
-              <a:ahLst/>
-              <a:cxnLst/>
-              <a:rect l="l" t="t" r="r" b="b"/>
-              <a:pathLst>
-                <a:path w="4256" h="487" fill="none" extrusionOk="0">
-                  <a:moveTo>
-                    <a:pt x="1" y="0"/>
-                  </a:moveTo>
-                  <a:cubicBezTo>
-                    <a:pt x="426" y="243"/>
-                    <a:pt x="1125" y="486"/>
-                    <a:pt x="2159" y="486"/>
-                  </a:cubicBezTo>
-                  <a:cubicBezTo>
-                    <a:pt x="3131" y="486"/>
-                    <a:pt x="3830" y="243"/>
-                    <a:pt x="4256" y="30"/>
-                  </a:cubicBezTo>
-                </a:path>
-              </a:pathLst>
-            </a:custGeom>
-            <a:noFill/>
-            <a:ln w="9525" cap="flat" cmpd="sng">
-              <a:solidFill>
-                <a:schemeClr val="accent2"/>
-              </a:solidFill>
-              <a:prstDash val="solid"/>
-              <a:miter lim="30395"/>
-              <a:headEnd type="none" w="sm" len="sm"/>
-              <a:tailEnd type="none" w="sm" len="sm"/>
-            </a:ln>
-          </p:spPr>
-          <p:txBody>
-            <a:bodyPr spcFirstLastPara="1" wrap="square" lIns="91425" tIns="91425" rIns="91425" bIns="91425" anchor="ctr" anchorCtr="0">
-              <a:noAutofit/>
-            </a:bodyPr>
-            <a:lstStyle/>
-            <a:p>
-              <a:pPr marL="0" marR="0" lvl="0" indent="0" algn="l" defTabSz="914400" rtl="0" eaLnBrk="1" fontAlgn="auto" latinLnBrk="0" hangingPunct="1">
-                <a:lnSpc>
-                  <a:spcPct val="100000"/>
-                </a:lnSpc>
-                <a:spcBef>
-                  <a:spcPts val="0"/>
-                </a:spcBef>
-                <a:spcAft>
-                  <a:spcPts val="0"/>
-                </a:spcAft>
-                <a:buClr>
-                  <a:srgbClr val="000000"/>
-                </a:buClr>
-                <a:buSzTx/>
-                <a:buFont typeface="Arial"/>
-                <a:buNone/>
-                <a:tabLst/>
-                <a:defRPr/>
-              </a:pPr>
-              <a:endParaRPr kumimoji="0" sz="1400" b="0" i="0" u="none" strike="noStrike" kern="0" cap="none" spc="0" normalizeH="0" baseline="0" noProof="0">
-                <a:ln>
-                  <a:noFill/>
-                </a:ln>
-                <a:solidFill>
-                  <a:srgbClr val="000000"/>
-                </a:solidFill>
-                <a:effectLst/>
-                <a:uLnTx/>
-                <a:uFillTx/>
-                <a:latin typeface="Arial"/>
-                <a:cs typeface="Arial"/>
-                <a:sym typeface="Arial"/>
-              </a:endParaRPr>
-            </a:p>
-          </p:txBody>
-        </p:sp>
-      </p:grpSp>
-    </p:spTree>
-  </p:cSld>
-  <p:clrMapOvr>
-    <a:masterClrMapping/>
-  </p:clrMapOvr>
-</p:sld>
-</file>
-
-<file path=ppt/slides/slide20.xml><?xml version="1.0" encoding="utf-8"?>
+<file path=ppt/slides/slide21.xml><?xml version="1.0" encoding="utf-8"?>
 <p:sld xmlns:a="http://schemas.openxmlformats.org/drawingml/2006/main" xmlns:r="http://schemas.openxmlformats.org/officeDocument/2006/relationships" xmlns:p="http://schemas.openxmlformats.org/presentationml/2006/main">
   <p:cSld>
     <p:spTree>
@@ -29483,7 +30349,7 @@
 </p:sld>
 </file>
 
-<file path=ppt/slides/slide21.xml><?xml version="1.0" encoding="utf-8"?>
+<file path=ppt/slides/slide22.xml><?xml version="1.0" encoding="utf-8"?>
 <p:sld xmlns:a="http://schemas.openxmlformats.org/drawingml/2006/main" xmlns:r="http://schemas.openxmlformats.org/officeDocument/2006/relationships" xmlns:p="http://schemas.openxmlformats.org/presentationml/2006/main">
   <p:cSld>
     <p:spTree>

</xml_diff>